<commit_message>
boxcox with preprocess and lm,bagtree added
</commit_message>
<xml_diff>
--- a/Presentation.pptx
+++ b/Presentation.pptx
@@ -268,67 +268,67 @@
       <cx:numDim type="val">
         <cx:f>Sheet1!$A$2:$A$77</cx:f>
         <cx:lvl ptCount="76" formatCode="General">
-          <cx:pt idx="0">10.3176048</cx:pt>
-          <cx:pt idx="1">12.277520900000001</cx:pt>
-          <cx:pt idx="2">9.8145126999999999</cx:pt>
-          <cx:pt idx="3">11.5330642</cx:pt>
-          <cx:pt idx="4">2.9354841</cx:pt>
-          <cx:pt idx="5">6.0212009000000002</cx:pt>
-          <cx:pt idx="6">11.284807600000001</cx:pt>
-          <cx:pt idx="7">10.713274800000001</cx:pt>
-          <cx:pt idx="8">11.088002700000001</cx:pt>
-          <cx:pt idx="9">10.986459200000001</cx:pt>
-          <cx:pt idx="10">5.9715946999999998</cx:pt>
-          <cx:pt idx="11">3.6461049999999999</cx:pt>
-          <cx:pt idx="12">3.0922729000000002</cx:pt>
-          <cx:pt idx="13">5.9802469</cx:pt>
-          <cx:pt idx="14">5.4549183000000001</cx:pt>
-          <cx:pt idx="15">18.7738263</cx:pt>
-          <cx:pt idx="16">1.0803457000000001</cx:pt>
-          <cx:pt idx="17">20.3408163</cx:pt>
-          <cx:pt idx="18">5.4174581999999996</cx:pt>
-          <cx:pt idx="19">17.544213200000002</cx:pt>
-          <cx:pt idx="20">15.325058800000001</cx:pt>
-          <cx:pt idx="21">8.4048628000000001</cx:pt>
-          <cx:pt idx="22">7.6766435</cx:pt>
-          <cx:pt idx="23">15.639639499999999</cx:pt>
-          <cx:pt idx="24">6.2849465999999996</cx:pt>
-          <cx:pt idx="25">12.488989699999999</cx:pt>
-          <cx:pt idx="26">7.6085982000000003</cx:pt>
-          <cx:pt idx="27">12.2998314</cx:pt>
-          <cx:pt idx="28">7.1402247000000001</cx:pt>
-          <cx:pt idx="29">10.0622794</cx:pt>
-          <cx:pt idx="30">1.2972313</cx:pt>
-          <cx:pt idx="31">5.3252420000000003</cx:pt>
-          <cx:pt idx="32">6.7799573999999998</cx:pt>
-          <cx:pt idx="33">5.8647308000000002</cx:pt>
-          <cx:pt idx="34">5.5315159999999999</cx:pt>
-          <cx:pt idx="35">5.2220247999999998</cx:pt>
-          <cx:pt idx="36">8.2726752999999995</cx:pt>
-          <cx:pt idx="37">8.5666758000000005</cx:pt>
-          <cx:pt idx="38">7.3452501000000003</cx:pt>
-          <cx:pt idx="39">7.6540222</cx:pt>
-          <cx:pt idx="40">7.4458748000000003</cx:pt>
-          <cx:pt idx="41">8.9170508999999996</cx:pt>
-          <cx:pt idx="42">6.6960712999999998</cx:pt>
-          <cx:pt idx="43">6.9488612999999999</cx:pt>
-          <cx:pt idx="44">11.3645326</cx:pt>
-          <cx:pt idx="45">5.4010020000000001</cx:pt>
-          <cx:pt idx="46">9.9726090999999997</cx:pt>
-          <cx:pt idx="47">6.1827038999999999</cx:pt>
-          <cx:pt idx="48">9.5479026000000005</cx:pt>
-          <cx:pt idx="49">5.7695813999999999</cx:pt>
-          <cx:pt idx="50">8.2726752999999995</cx:pt>
-          <cx:pt idx="51">-0.2576599</cx:pt>
-          <cx:pt idx="52">10.1646055</cx:pt>
-          <cx:pt idx="53">-1.4138773</cx:pt>
-          <cx:pt idx="54">3.1279683999999999</cx:pt>
-          <cx:pt idx="55">1.7905517</cx:pt>
-          <cx:pt idx="56">4.4799112000000001</cx:pt>
-          <cx:pt idx="57">9.4908763999999994</cx:pt>
-          <cx:pt idx="58">-1.0649814</cx:pt>
-          <cx:pt idx="59">8.9518421000000004</cx:pt>
-          <cx:pt idx="60">8.0123713999999993</cx:pt>
+          <cx:pt idx="0">8.8440323999999997</cx:pt>
+          <cx:pt idx="1">10.363087200000001</cx:pt>
+          <cx:pt idx="2">8.4489117999999994</cx:pt>
+          <cx:pt idx="3">9.7896946000000007</cx:pt>
+          <cx:pt idx="4">2.7431922000000002</cx:pt>
+          <cx:pt idx="5">5.3855978999999996</cx:pt>
+          <cx:pt idx="6">9.5975277999999999</cx:pt>
+          <cx:pt idx="7">9.1532263</cx:pt>
+          <cx:pt idx="8">9.4448369999999997</cx:pt>
+          <cx:pt idx="9">9.3659312999999997</cx:pt>
+          <cx:pt idx="10">5.3443795999999999</cx:pt>
+          <cx:pt idx="11">3.3678227999999999</cx:pt>
+          <cx:pt idx="12">2.8819984999999999</cx:pt>
+          <cx:pt idx="13">5.3515712999999998</cx:pt>
+          <cx:pt idx="14">4.9129377999999999</cx:pt>
+          <cx:pt idx="15">15.213916599999999</cx:pt>
+          <cx:pt idx="16">1.0483340999999999</cx:pt>
+          <cx:pt idx="17">16.350041000000001</cx:pt>
+          <cx:pt idx="18">4.8815018999999999</cx:pt>
+          <cx:pt idx="19">14.3141154</cx:pt>
+          <cx:pt idx="20">12.669907200000001</cx:pt>
+          <cx:pt idx="21">7.3290648000000003</cx:pt>
+          <cx:pt idx="22">6.7425148000000004</cx:pt>
+          <cx:pt idx="23">12.9046754</cx:pt>
+          <cx:pt idx="24">5.6041685000000001</cx:pt>
+          <cx:pt idx="25">10.5252052</cx:pt>
+          <cx:pt idx="26">6.6874042999999999</cx:pt>
+          <cx:pt idx="27">10.380206599999999</cx:pt>
+          <cx:pt idx="28">6.3065905000000004</cx:pt>
+          <cx:pt idx="29">8.6437868000000009</cx:pt>
+          <cx:pt idx="30">1.2523526</cx:pt>
+          <cx:pt idx="31">4.8040228999999997</cx:pt>
+          <cx:pt idx="32">6.0118571000000003</cx:pt>
+          <cx:pt idx="33">5.2554657999999996</cx:pt>
+          <cx:pt idx="34">4.9771507000000001</cx:pt>
+          <cx:pt idx="35">4.7171430000000001</cx:pt>
+          <cx:pt idx="36">7.2230229000000001</cx:pt>
+          <cx:pt idx="37">7.4586217000000001</cx:pt>
+          <cx:pt idx="38">6.4736085000000001</cx:pt>
+          <cx:pt idx="39">6.7241995000000001</cx:pt>
+          <cx:pt idx="40">6.5553955999999998</cx:pt>
+          <cx:pt idx="41">7.7382267999999996</cx:pt>
+          <cx:pt idx="42">5.9429948000000001</cx:pt>
+          <cx:pt idx="43">6.1502388000000003</cx:pt>
+          <cx:pt idx="44">9.6592935999999998</cx:pt>
+          <cx:pt idx="45">4.8676852999999998</cx:pt>
+          <cx:pt idx="46">8.5733227999999997</cx:pt>
+          <cx:pt idx="47">5.5195525999999999</cx:pt>
+          <cx:pt idx="48">8.2385874999999995</cx:pt>
+          <cx:pt idx="49">5.1761600999999997</cx:pt>
+          <cx:pt idx="50">7.2230229000000001</cx:pt>
+          <cx:pt idx="51">-0.25991009999999998</cx:pt>
+          <cx:pt idx="52">8.7241079999999993</cx:pt>
+          <cx:pt idx="53">-1.5047321</cx:pt>
+          <cx:pt idx="54">2.9135187</cx:pt>
+          <cx:pt idx="55">1.7099713000000001</cx:pt>
+          <cx:pt idx="56">4.0873322999999999</cx:pt>
+          <cx:pt idx="57">8.1935143999999998</cx:pt>
+          <cx:pt idx="58">-1.1112274</cx:pt>
+          <cx:pt idx="59">7.7659228999999996</cx:pt>
+          <cx:pt idx="60">7.0136548000000003</cx:pt>
         </cx:lvl>
       </cx:numDim>
     </cx:data>
@@ -10046,7 +10046,7 @@
           <a:p>
             <a:fld id="{6B55AB82-CD6A-48E6-BBFB-7B4CA324A7D9}" type="datetimeFigureOut">
               <a:rPr lang="en-IN" smtClean="0"/>
-              <a:t>02-07-2023</a:t>
+              <a:t>04-07-2023</a:t>
             </a:fld>
             <a:endParaRPr lang="en-IN"/>
           </a:p>
@@ -10254,7 +10254,7 @@
           <a:p>
             <a:fld id="{6B55AB82-CD6A-48E6-BBFB-7B4CA324A7D9}" type="datetimeFigureOut">
               <a:rPr lang="en-IN" smtClean="0"/>
-              <a:t>02-07-2023</a:t>
+              <a:t>04-07-2023</a:t>
             </a:fld>
             <a:endParaRPr lang="en-IN"/>
           </a:p>
@@ -10512,7 +10512,7 @@
           <a:p>
             <a:fld id="{6B55AB82-CD6A-48E6-BBFB-7B4CA324A7D9}" type="datetimeFigureOut">
               <a:rPr lang="en-IN" smtClean="0"/>
-              <a:t>02-07-2023</a:t>
+              <a:t>04-07-2023</a:t>
             </a:fld>
             <a:endParaRPr lang="en-IN"/>
           </a:p>
@@ -10682,7 +10682,7 @@
           <a:p>
             <a:fld id="{6B55AB82-CD6A-48E6-BBFB-7B4CA324A7D9}" type="datetimeFigureOut">
               <a:rPr lang="en-IN" smtClean="0"/>
-              <a:t>02-07-2023</a:t>
+              <a:t>04-07-2023</a:t>
             </a:fld>
             <a:endParaRPr lang="en-IN"/>
           </a:p>
@@ -11019,7 +11019,7 @@
           <a:p>
             <a:fld id="{6B55AB82-CD6A-48E6-BBFB-7B4CA324A7D9}" type="datetimeFigureOut">
               <a:rPr lang="en-IN" smtClean="0"/>
-              <a:t>02-07-2023</a:t>
+              <a:t>04-07-2023</a:t>
             </a:fld>
             <a:endParaRPr lang="en-IN"/>
           </a:p>
@@ -11294,7 +11294,7 @@
           <a:p>
             <a:fld id="{6B55AB82-CD6A-48E6-BBFB-7B4CA324A7D9}" type="datetimeFigureOut">
               <a:rPr lang="en-IN" smtClean="0"/>
-              <a:t>02-07-2023</a:t>
+              <a:t>04-07-2023</a:t>
             </a:fld>
             <a:endParaRPr lang="en-IN"/>
           </a:p>
@@ -11673,7 +11673,7 @@
           <a:p>
             <a:fld id="{6B55AB82-CD6A-48E6-BBFB-7B4CA324A7D9}" type="datetimeFigureOut">
               <a:rPr lang="en-IN" smtClean="0"/>
-              <a:t>02-07-2023</a:t>
+              <a:t>04-07-2023</a:t>
             </a:fld>
             <a:endParaRPr lang="en-IN"/>
           </a:p>
@@ -11791,7 +11791,7 @@
           <a:p>
             <a:fld id="{6B55AB82-CD6A-48E6-BBFB-7B4CA324A7D9}" type="datetimeFigureOut">
               <a:rPr lang="en-IN" smtClean="0"/>
-              <a:t>02-07-2023</a:t>
+              <a:t>04-07-2023</a:t>
             </a:fld>
             <a:endParaRPr lang="en-IN"/>
           </a:p>
@@ -11964,7 +11964,7 @@
           <a:p>
             <a:fld id="{6B55AB82-CD6A-48E6-BBFB-7B4CA324A7D9}" type="datetimeFigureOut">
               <a:rPr lang="en-IN" smtClean="0"/>
-              <a:t>02-07-2023</a:t>
+              <a:t>04-07-2023</a:t>
             </a:fld>
             <a:endParaRPr lang="en-IN"/>
           </a:p>
@@ -12320,7 +12320,7 @@
           <a:p>
             <a:fld id="{6B55AB82-CD6A-48E6-BBFB-7B4CA324A7D9}" type="datetimeFigureOut">
               <a:rPr lang="en-IN" smtClean="0"/>
-              <a:t>02-07-2023</a:t>
+              <a:t>04-07-2023</a:t>
             </a:fld>
             <a:endParaRPr lang="en-IN"/>
           </a:p>
@@ -12699,7 +12699,7 @@
           <a:p>
             <a:fld id="{6B55AB82-CD6A-48E6-BBFB-7B4CA324A7D9}" type="datetimeFigureOut">
               <a:rPr lang="en-IN" smtClean="0"/>
-              <a:t>02-07-2023</a:t>
+              <a:t>04-07-2023</a:t>
             </a:fld>
             <a:endParaRPr lang="en-IN"/>
           </a:p>
@@ -12988,7 +12988,7 @@
           <a:p>
             <a:fld id="{6B55AB82-CD6A-48E6-BBFB-7B4CA324A7D9}" type="datetimeFigureOut">
               <a:rPr lang="en-IN" smtClean="0"/>
-              <a:t>02-07-2023</a:t>
+              <a:t>04-07-2023</a:t>
             </a:fld>
             <a:endParaRPr lang="en-IN"/>
           </a:p>
@@ -14440,13 +14440,13 @@
   <p:clrMapOvr>
     <a:masterClrMapping/>
   </p:clrMapOvr>
-  <mc:AlternateContent xmlns:mc="http://schemas.openxmlformats.org/markup-compatibility/2006" xmlns:p159="http://schemas.microsoft.com/office/powerpoint/2015/09/main">
-    <mc:Choice Requires="p159">
-      <p:transition xmlns:p14="http://schemas.microsoft.com/office/powerpoint/2010/main" spd="slow" p14:dur="2000">
+  <mc:AlternateContent xmlns:mc="http://schemas.openxmlformats.org/markup-compatibility/2006">
+    <mc:Choice xmlns:p159="http://schemas.microsoft.com/office/powerpoint/2015/09/main" Requires="p159">
+      <p:transition spd="slow">
         <p159:morph option="byObject"/>
       </p:transition>
     </mc:Choice>
-    <mc:Fallback xmlns="">
+    <mc:Fallback>
       <p:transition spd="slow">
         <p:fade/>
       </p:transition>
@@ -14785,7 +14785,7 @@
   </p:clrMapOvr>
   <mc:AlternateContent xmlns:mc="http://schemas.openxmlformats.org/markup-compatibility/2006">
     <mc:Choice xmlns:p159="http://schemas.microsoft.com/office/powerpoint/2015/09/main" Requires="p159">
-      <p:transition xmlns:p14="http://schemas.microsoft.com/office/powerpoint/2010/main" spd="slow" p14:dur="2000">
+      <p:transition spd="slow">
         <p159:morph option="byObject"/>
       </p:transition>
     </mc:Choice>
@@ -14843,8 +14843,8 @@
           </a:p>
         </p:txBody>
       </p:sp>
-      <mc:AlternateContent xmlns:mc="http://schemas.openxmlformats.org/markup-compatibility/2006">
-        <mc:Choice xmlns:cx1="http://schemas.microsoft.com/office/drawing/2015/9/8/chartex" Requires="cx1">
+      <mc:AlternateContent xmlns:mc="http://schemas.openxmlformats.org/markup-compatibility/2006" xmlns:cx1="http://schemas.microsoft.com/office/drawing/2015/9/8/chartex">
+        <mc:Choice Requires="cx1">
           <p:graphicFrame>
             <p:nvGraphicFramePr>
               <p:cNvPr id="5" name="Chart 4">
@@ -14874,7 +14874,7 @@
             </a:graphic>
           </p:graphicFrame>
         </mc:Choice>
-        <mc:Fallback>
+        <mc:Fallback xmlns="">
           <p:pic>
             <p:nvPicPr>
               <p:cNvPr id="5" name="Chart 4">
@@ -14948,8 +14948,8 @@
           </a:fontRef>
         </p:style>
       </p:cxnSp>
-      <mc:AlternateContent xmlns:mc="http://schemas.openxmlformats.org/markup-compatibility/2006">
-        <mc:Choice xmlns:a14="http://schemas.microsoft.com/office/drawing/2010/main" Requires="a14">
+      <mc:AlternateContent xmlns:mc="http://schemas.openxmlformats.org/markup-compatibility/2006" xmlns:a14="http://schemas.microsoft.com/office/drawing/2010/main">
+        <mc:Choice Requires="a14">
           <p:sp>
             <p:nvSpPr>
               <p:cNvPr id="12" name="TextBox 11">
@@ -14978,6 +14978,7 @@
               </a:bodyPr>
               <a:lstStyle/>
               <a:p>
+                <a:pPr/>
                 <a14:m>
                   <m:oMathPara xmlns:m="http://schemas.openxmlformats.org/officeDocument/2006/math">
                     <m:oMathParaPr>
@@ -15105,7 +15106,7 @@
             </p:txBody>
           </p:sp>
         </mc:Choice>
-        <mc:Fallback>
+        <mc:Fallback xmlns="">
           <p:sp>
             <p:nvSpPr>
               <p:cNvPr id="12" name="TextBox 11">
@@ -15223,7 +15224,7 @@
               <p:nvPr>
                 <p:extLst>
                   <p:ext uri="{D42A27DB-BD31-4B8C-83A1-F6EECF244321}">
-                    <p14:modId xmlns:p14="http://schemas.microsoft.com/office/powerpoint/2010/main" val="1577440421"/>
+                    <p14:modId xmlns:p14="http://schemas.microsoft.com/office/powerpoint/2010/main" val="3746214316"/>
                   </p:ext>
                 </p:extLst>
               </p:nvPr>

</xml_diff>

<commit_message>
summary of all the models added
</commit_message>
<xml_diff>
--- a/Presentation.pptx
+++ b/Presentation.pptx
@@ -13,6 +13,8 @@
     <p:sldId id="263" r:id="rId7"/>
     <p:sldId id="259" r:id="rId8"/>
     <p:sldId id="260" r:id="rId9"/>
+    <p:sldId id="264" r:id="rId10"/>
+    <p:sldId id="265" r:id="rId11"/>
   </p:sldIdLst>
   <p:sldSz cx="12192000" cy="6858000"/>
   <p:notesSz cx="6858000" cy="9144000"/>
@@ -117,6 +119,1026 @@
     </p:ext>
   </p:extLst>
 </p:presentation>
+</file>
+
+<file path=ppt/charts/chart1.xml><?xml version="1.0" encoding="utf-8"?>
+<c:chartSpace xmlns:c="http://schemas.openxmlformats.org/drawingml/2006/chart" xmlns:a="http://schemas.openxmlformats.org/drawingml/2006/main" xmlns:r="http://schemas.openxmlformats.org/officeDocument/2006/relationships" xmlns:c16r2="http://schemas.microsoft.com/office/drawing/2015/06/chart">
+  <c:date1904 val="0"/>
+  <c:lang val="en-US"/>
+  <c:roundedCorners val="0"/>
+  <mc:AlternateContent xmlns:mc="http://schemas.openxmlformats.org/markup-compatibility/2006">
+    <mc:Choice xmlns:c14="http://schemas.microsoft.com/office/drawing/2007/8/2/chart" Requires="c14">
+      <c14:style val="102"/>
+    </mc:Choice>
+    <mc:Fallback>
+      <c:style val="2"/>
+    </mc:Fallback>
+  </mc:AlternateContent>
+  <c:chart>
+    <c:title>
+      <c:tx>
+        <c:rich>
+          <a:bodyPr rot="0" spcFirstLastPara="1" vertOverflow="ellipsis" vert="horz" wrap="square" anchor="ctr" anchorCtr="1"/>
+          <a:lstStyle/>
+          <a:p>
+            <a:pPr>
+              <a:defRPr sz="1862" b="0" i="0" u="none" strike="noStrike" kern="1200" spc="0" baseline="0">
+                <a:solidFill>
+                  <a:schemeClr val="tx1">
+                    <a:lumMod val="65000"/>
+                    <a:lumOff val="35000"/>
+                  </a:schemeClr>
+                </a:solidFill>
+                <a:latin typeface="+mn-lt"/>
+                <a:ea typeface="+mn-ea"/>
+                <a:cs typeface="+mn-cs"/>
+              </a:defRPr>
+            </a:pPr>
+            <a:r>
+              <a:rPr lang="en-IN" dirty="0"/>
+              <a:t>Gene Pathways</a:t>
+            </a:r>
+          </a:p>
+        </c:rich>
+      </c:tx>
+      <c:overlay val="0"/>
+      <c:spPr>
+        <a:noFill/>
+        <a:ln>
+          <a:noFill/>
+        </a:ln>
+        <a:effectLst/>
+      </c:spPr>
+      <c:txPr>
+        <a:bodyPr rot="0" spcFirstLastPara="1" vertOverflow="ellipsis" vert="horz" wrap="square" anchor="ctr" anchorCtr="1"/>
+        <a:lstStyle/>
+        <a:p>
+          <a:pPr>
+            <a:defRPr sz="1862" b="0" i="0" u="none" strike="noStrike" kern="1200" spc="0" baseline="0">
+              <a:solidFill>
+                <a:schemeClr val="tx1">
+                  <a:lumMod val="65000"/>
+                  <a:lumOff val="35000"/>
+                </a:schemeClr>
+              </a:solidFill>
+              <a:latin typeface="+mn-lt"/>
+              <a:ea typeface="+mn-ea"/>
+              <a:cs typeface="+mn-cs"/>
+            </a:defRPr>
+          </a:pPr>
+          <a:endParaRPr lang="en-US"/>
+        </a:p>
+      </c:txPr>
+    </c:title>
+    <c:autoTitleDeleted val="0"/>
+    <c:plotArea>
+      <c:layout/>
+      <c:barChart>
+        <c:barDir val="col"/>
+        <c:grouping val="clustered"/>
+        <c:varyColors val="0"/>
+        <c:ser>
+          <c:idx val="0"/>
+          <c:order val="0"/>
+          <c:tx>
+            <c:strRef>
+              <c:f>Sheet1!$B$1</c:f>
+              <c:strCache>
+                <c:ptCount val="1"/>
+                <c:pt idx="0">
+                  <c:v>RMSE</c:v>
+                </c:pt>
+              </c:strCache>
+            </c:strRef>
+          </c:tx>
+          <c:spPr>
+            <a:solidFill>
+              <a:schemeClr val="accent1"/>
+            </a:solidFill>
+            <a:ln>
+              <a:noFill/>
+            </a:ln>
+            <a:effectLst/>
+          </c:spPr>
+          <c:invertIfNegative val="0"/>
+          <c:dLbls>
+            <c:numFmt formatCode="#,##0.00" sourceLinked="0"/>
+            <c:spPr>
+              <a:noFill/>
+              <a:ln>
+                <a:noFill/>
+              </a:ln>
+              <a:effectLst/>
+            </c:spPr>
+            <c:txPr>
+              <a:bodyPr rot="0" spcFirstLastPara="1" vertOverflow="ellipsis" vert="horz" wrap="square" lIns="38100" tIns="19050" rIns="38100" bIns="19050" anchor="ctr" anchorCtr="1">
+                <a:spAutoFit/>
+              </a:bodyPr>
+              <a:lstStyle/>
+              <a:p>
+                <a:pPr>
+                  <a:defRPr sz="1197" b="0" i="0" u="none" strike="noStrike" kern="1200" baseline="0">
+                    <a:solidFill>
+                      <a:schemeClr val="tx1">
+                        <a:lumMod val="75000"/>
+                        <a:lumOff val="25000"/>
+                      </a:schemeClr>
+                    </a:solidFill>
+                    <a:latin typeface="+mn-lt"/>
+                    <a:ea typeface="+mn-ea"/>
+                    <a:cs typeface="+mn-cs"/>
+                  </a:defRPr>
+                </a:pPr>
+                <a:endParaRPr lang="en-US"/>
+              </a:p>
+            </c:txPr>
+            <c:showLegendKey val="0"/>
+            <c:showVal val="1"/>
+            <c:showCatName val="0"/>
+            <c:showSerName val="0"/>
+            <c:showPercent val="0"/>
+            <c:showBubbleSize val="0"/>
+            <c:showLeaderLines val="0"/>
+            <c:extLst>
+              <c:ext xmlns:c15="http://schemas.microsoft.com/office/drawing/2012/chart" uri="{CE6537A1-D6FC-4f65-9D91-7224C49458BB}">
+                <c15:showLeaderLines val="1"/>
+                <c15:leaderLines>
+                  <c:spPr>
+                    <a:ln w="9525" cap="flat" cmpd="sng" algn="ctr">
+                      <a:solidFill>
+                        <a:schemeClr val="tx1">
+                          <a:lumMod val="35000"/>
+                          <a:lumOff val="65000"/>
+                        </a:schemeClr>
+                      </a:solidFill>
+                      <a:round/>
+                    </a:ln>
+                    <a:effectLst/>
+                  </c:spPr>
+                </c15:leaderLines>
+              </c:ext>
+            </c:extLst>
+          </c:dLbls>
+          <c:cat>
+            <c:strRef>
+              <c:f>Sheet1!$A$2:$A$7</c:f>
+              <c:strCache>
+                <c:ptCount val="6"/>
+                <c:pt idx="0">
+                  <c:v>Naive</c:v>
+                </c:pt>
+                <c:pt idx="1">
+                  <c:v>Random Forests</c:v>
+                </c:pt>
+                <c:pt idx="2">
+                  <c:v>Boruta with Confirmed</c:v>
+                </c:pt>
+                <c:pt idx="3">
+                  <c:v>Boruta with Confirmed and Tentative</c:v>
+                </c:pt>
+                <c:pt idx="4">
+                  <c:v>LM</c:v>
+                </c:pt>
+                <c:pt idx="5">
+                  <c:v>Bagged Trees</c:v>
+                </c:pt>
+              </c:strCache>
+            </c:strRef>
+          </c:cat>
+          <c:val>
+            <c:numRef>
+              <c:f>Sheet1!$B$2:$B$7</c:f>
+              <c:numCache>
+                <c:formatCode>General</c:formatCode>
+                <c:ptCount val="6"/>
+                <c:pt idx="0">
+                  <c:v>5.5321999999999996</c:v>
+                </c:pt>
+                <c:pt idx="1">
+                  <c:v>3.5957080000000001</c:v>
+                </c:pt>
+                <c:pt idx="2">
+                  <c:v>3.2955519999999998</c:v>
+                </c:pt>
+                <c:pt idx="3">
+                  <c:v>3.1630760000000002</c:v>
+                </c:pt>
+                <c:pt idx="4">
+                  <c:v>3.5241169999999999</c:v>
+                </c:pt>
+                <c:pt idx="5">
+                  <c:v>3.3890009999999999</c:v>
+                </c:pt>
+              </c:numCache>
+            </c:numRef>
+          </c:val>
+          <c:extLst>
+            <c:ext xmlns:c16="http://schemas.microsoft.com/office/drawing/2014/chart" uri="{C3380CC4-5D6E-409C-BE32-E72D297353CC}">
+              <c16:uniqueId val="{00000000-72F3-4DDF-A8D5-A2BAA9C20CE9}"/>
+            </c:ext>
+          </c:extLst>
+        </c:ser>
+        <c:ser>
+          <c:idx val="1"/>
+          <c:order val="1"/>
+          <c:tx>
+            <c:strRef>
+              <c:f>Sheet1!$C$1</c:f>
+              <c:strCache>
+                <c:ptCount val="1"/>
+                <c:pt idx="0">
+                  <c:v>MAE</c:v>
+                </c:pt>
+              </c:strCache>
+            </c:strRef>
+          </c:tx>
+          <c:spPr>
+            <a:solidFill>
+              <a:schemeClr val="accent2"/>
+            </a:solidFill>
+            <a:ln>
+              <a:noFill/>
+            </a:ln>
+            <a:effectLst/>
+          </c:spPr>
+          <c:invertIfNegative val="0"/>
+          <c:dLbls>
+            <c:numFmt formatCode="#,##0.00" sourceLinked="0"/>
+            <c:spPr>
+              <a:noFill/>
+              <a:ln>
+                <a:noFill/>
+              </a:ln>
+              <a:effectLst/>
+            </c:spPr>
+            <c:txPr>
+              <a:bodyPr rot="0" spcFirstLastPara="1" vertOverflow="ellipsis" vert="horz" wrap="square" lIns="38100" tIns="19050" rIns="38100" bIns="19050" anchor="ctr" anchorCtr="1">
+                <a:spAutoFit/>
+              </a:bodyPr>
+              <a:lstStyle/>
+              <a:p>
+                <a:pPr>
+                  <a:defRPr sz="1197" b="0" i="0" u="none" strike="noStrike" kern="1200" baseline="0">
+                    <a:solidFill>
+                      <a:schemeClr val="tx1">
+                        <a:lumMod val="75000"/>
+                        <a:lumOff val="25000"/>
+                      </a:schemeClr>
+                    </a:solidFill>
+                    <a:latin typeface="+mn-lt"/>
+                    <a:ea typeface="+mn-ea"/>
+                    <a:cs typeface="+mn-cs"/>
+                  </a:defRPr>
+                </a:pPr>
+                <a:endParaRPr lang="en-US"/>
+              </a:p>
+            </c:txPr>
+            <c:showLegendKey val="0"/>
+            <c:showVal val="1"/>
+            <c:showCatName val="0"/>
+            <c:showSerName val="0"/>
+            <c:showPercent val="0"/>
+            <c:showBubbleSize val="0"/>
+            <c:showLeaderLines val="0"/>
+            <c:extLst>
+              <c:ext xmlns:c15="http://schemas.microsoft.com/office/drawing/2012/chart" uri="{CE6537A1-D6FC-4f65-9D91-7224C49458BB}">
+                <c15:showLeaderLines val="1"/>
+                <c15:leaderLines>
+                  <c:spPr>
+                    <a:ln w="9525" cap="flat" cmpd="sng" algn="ctr">
+                      <a:solidFill>
+                        <a:schemeClr val="tx1">
+                          <a:lumMod val="35000"/>
+                          <a:lumOff val="65000"/>
+                        </a:schemeClr>
+                      </a:solidFill>
+                      <a:round/>
+                    </a:ln>
+                    <a:effectLst/>
+                  </c:spPr>
+                </c15:leaderLines>
+              </c:ext>
+            </c:extLst>
+          </c:dLbls>
+          <c:cat>
+            <c:strRef>
+              <c:f>Sheet1!$A$2:$A$7</c:f>
+              <c:strCache>
+                <c:ptCount val="6"/>
+                <c:pt idx="0">
+                  <c:v>Naive</c:v>
+                </c:pt>
+                <c:pt idx="1">
+                  <c:v>Random Forests</c:v>
+                </c:pt>
+                <c:pt idx="2">
+                  <c:v>Boruta with Confirmed</c:v>
+                </c:pt>
+                <c:pt idx="3">
+                  <c:v>Boruta with Confirmed and Tentative</c:v>
+                </c:pt>
+                <c:pt idx="4">
+                  <c:v>LM</c:v>
+                </c:pt>
+                <c:pt idx="5">
+                  <c:v>Bagged Trees</c:v>
+                </c:pt>
+              </c:strCache>
+            </c:strRef>
+          </c:cat>
+          <c:val>
+            <c:numRef>
+              <c:f>Sheet1!$C$2:$C$7</c:f>
+              <c:numCache>
+                <c:formatCode>General</c:formatCode>
+                <c:ptCount val="6"/>
+                <c:pt idx="0">
+                  <c:v>4.3321829999999997</c:v>
+                </c:pt>
+                <c:pt idx="1">
+                  <c:v>2.8863110000000001</c:v>
+                </c:pt>
+                <c:pt idx="2">
+                  <c:v>2.6919780000000002</c:v>
+                </c:pt>
+                <c:pt idx="3">
+                  <c:v>2.496604</c:v>
+                </c:pt>
+                <c:pt idx="4">
+                  <c:v>2.8208280000000001</c:v>
+                </c:pt>
+                <c:pt idx="5">
+                  <c:v>2.7382330000000001</c:v>
+                </c:pt>
+              </c:numCache>
+            </c:numRef>
+          </c:val>
+          <c:extLst>
+            <c:ext xmlns:c16="http://schemas.microsoft.com/office/drawing/2014/chart" uri="{C3380CC4-5D6E-409C-BE32-E72D297353CC}">
+              <c16:uniqueId val="{00000001-72F3-4DDF-A8D5-A2BAA9C20CE9}"/>
+            </c:ext>
+          </c:extLst>
+        </c:ser>
+        <c:dLbls>
+          <c:showLegendKey val="0"/>
+          <c:showVal val="1"/>
+          <c:showCatName val="0"/>
+          <c:showSerName val="0"/>
+          <c:showPercent val="0"/>
+          <c:showBubbleSize val="0"/>
+        </c:dLbls>
+        <c:gapWidth val="150"/>
+        <c:overlap val="-25"/>
+        <c:axId val="205208383"/>
+        <c:axId val="205199263"/>
+      </c:barChart>
+      <c:catAx>
+        <c:axId val="205208383"/>
+        <c:scaling>
+          <c:orientation val="minMax"/>
+        </c:scaling>
+        <c:delete val="0"/>
+        <c:axPos val="b"/>
+        <c:numFmt formatCode="General" sourceLinked="1"/>
+        <c:majorTickMark val="none"/>
+        <c:minorTickMark val="none"/>
+        <c:tickLblPos val="nextTo"/>
+        <c:spPr>
+          <a:noFill/>
+          <a:ln w="9525" cap="flat" cmpd="sng" algn="ctr">
+            <a:solidFill>
+              <a:schemeClr val="tx1">
+                <a:lumMod val="15000"/>
+                <a:lumOff val="85000"/>
+              </a:schemeClr>
+            </a:solidFill>
+            <a:round/>
+          </a:ln>
+          <a:effectLst/>
+        </c:spPr>
+        <c:txPr>
+          <a:bodyPr rot="-60000000" spcFirstLastPara="1" vertOverflow="ellipsis" vert="horz" wrap="square" anchor="ctr" anchorCtr="1"/>
+          <a:lstStyle/>
+          <a:p>
+            <a:pPr>
+              <a:defRPr sz="1197" b="0" i="0" u="none" strike="noStrike" kern="1200" baseline="0">
+                <a:solidFill>
+                  <a:schemeClr val="tx1">
+                    <a:lumMod val="65000"/>
+                    <a:lumOff val="35000"/>
+                  </a:schemeClr>
+                </a:solidFill>
+                <a:latin typeface="+mn-lt"/>
+                <a:ea typeface="+mn-ea"/>
+                <a:cs typeface="+mn-cs"/>
+              </a:defRPr>
+            </a:pPr>
+            <a:endParaRPr lang="en-US"/>
+          </a:p>
+        </c:txPr>
+        <c:crossAx val="205199263"/>
+        <c:crosses val="autoZero"/>
+        <c:auto val="1"/>
+        <c:lblAlgn val="ctr"/>
+        <c:lblOffset val="100"/>
+        <c:noMultiLvlLbl val="0"/>
+      </c:catAx>
+      <c:valAx>
+        <c:axId val="205199263"/>
+        <c:scaling>
+          <c:orientation val="minMax"/>
+        </c:scaling>
+        <c:delete val="1"/>
+        <c:axPos val="l"/>
+        <c:numFmt formatCode="General" sourceLinked="1"/>
+        <c:majorTickMark val="none"/>
+        <c:minorTickMark val="none"/>
+        <c:tickLblPos val="nextTo"/>
+        <c:crossAx val="205208383"/>
+        <c:crosses val="autoZero"/>
+        <c:crossBetween val="between"/>
+      </c:valAx>
+      <c:spPr>
+        <a:noFill/>
+        <a:ln>
+          <a:noFill/>
+        </a:ln>
+        <a:effectLst/>
+      </c:spPr>
+    </c:plotArea>
+    <c:legend>
+      <c:legendPos val="t"/>
+      <c:overlay val="0"/>
+      <c:spPr>
+        <a:noFill/>
+        <a:ln>
+          <a:noFill/>
+        </a:ln>
+        <a:effectLst/>
+      </c:spPr>
+      <c:txPr>
+        <a:bodyPr rot="0" spcFirstLastPara="1" vertOverflow="ellipsis" vert="horz" wrap="square" anchor="ctr" anchorCtr="1"/>
+        <a:lstStyle/>
+        <a:p>
+          <a:pPr>
+            <a:defRPr sz="1197" b="0" i="0" u="none" strike="noStrike" kern="1200" baseline="0">
+              <a:solidFill>
+                <a:schemeClr val="tx1">
+                  <a:lumMod val="65000"/>
+                  <a:lumOff val="35000"/>
+                </a:schemeClr>
+              </a:solidFill>
+              <a:latin typeface="+mn-lt"/>
+              <a:ea typeface="+mn-ea"/>
+              <a:cs typeface="+mn-cs"/>
+            </a:defRPr>
+          </a:pPr>
+          <a:endParaRPr lang="en-US"/>
+        </a:p>
+      </c:txPr>
+    </c:legend>
+    <c:plotVisOnly val="1"/>
+    <c:dispBlanksAs val="gap"/>
+    <c:extLst>
+      <c:ext xmlns:c16r3="http://schemas.microsoft.com/office/drawing/2017/03/chart" uri="{56B9EC1D-385E-4148-901F-78D8002777C0}">
+        <c16r3:dataDisplayOptions16>
+          <c16r3:dispNaAsBlank val="1"/>
+        </c16r3:dataDisplayOptions16>
+      </c:ext>
+    </c:extLst>
+    <c:showDLblsOverMax val="0"/>
+  </c:chart>
+  <c:spPr>
+    <a:noFill/>
+    <a:ln>
+      <a:noFill/>
+    </a:ln>
+    <a:effectLst/>
+  </c:spPr>
+  <c:txPr>
+    <a:bodyPr/>
+    <a:lstStyle/>
+    <a:p>
+      <a:pPr>
+        <a:defRPr/>
+      </a:pPr>
+      <a:endParaRPr lang="en-US"/>
+    </a:p>
+  </c:txPr>
+  <c:externalData r:id="rId3">
+    <c:autoUpdate val="0"/>
+  </c:externalData>
+</c:chartSpace>
+</file>
+
+<file path=ppt/charts/chart2.xml><?xml version="1.0" encoding="utf-8"?>
+<c:chartSpace xmlns:c="http://schemas.openxmlformats.org/drawingml/2006/chart" xmlns:a="http://schemas.openxmlformats.org/drawingml/2006/main" xmlns:r="http://schemas.openxmlformats.org/officeDocument/2006/relationships" xmlns:c16r2="http://schemas.microsoft.com/office/drawing/2015/06/chart">
+  <c:date1904 val="0"/>
+  <c:lang val="en-US"/>
+  <c:roundedCorners val="0"/>
+  <mc:AlternateContent xmlns:mc="http://schemas.openxmlformats.org/markup-compatibility/2006">
+    <mc:Choice xmlns:c14="http://schemas.microsoft.com/office/drawing/2007/8/2/chart" Requires="c14">
+      <c14:style val="102"/>
+    </mc:Choice>
+    <mc:Fallback>
+      <c:style val="2"/>
+    </mc:Fallback>
+  </mc:AlternateContent>
+  <c:chart>
+    <c:title>
+      <c:tx>
+        <c:rich>
+          <a:bodyPr rot="0" spcFirstLastPara="1" vertOverflow="ellipsis" vert="horz" wrap="square" anchor="ctr" anchorCtr="1"/>
+          <a:lstStyle/>
+          <a:p>
+            <a:pPr>
+              <a:defRPr sz="1862" b="0" i="0" u="none" strike="noStrike" kern="1200" spc="0" baseline="0">
+                <a:solidFill>
+                  <a:schemeClr val="tx1">
+                    <a:lumMod val="65000"/>
+                    <a:lumOff val="35000"/>
+                  </a:schemeClr>
+                </a:solidFill>
+                <a:latin typeface="+mn-lt"/>
+                <a:ea typeface="+mn-ea"/>
+                <a:cs typeface="+mn-cs"/>
+              </a:defRPr>
+            </a:pPr>
+            <a:r>
+              <a:rPr lang="en-IN" dirty="0"/>
+              <a:t>Imaging</a:t>
+            </a:r>
+          </a:p>
+        </c:rich>
+      </c:tx>
+      <c:overlay val="0"/>
+      <c:spPr>
+        <a:noFill/>
+        <a:ln>
+          <a:noFill/>
+        </a:ln>
+        <a:effectLst/>
+      </c:spPr>
+      <c:txPr>
+        <a:bodyPr rot="0" spcFirstLastPara="1" vertOverflow="ellipsis" vert="horz" wrap="square" anchor="ctr" anchorCtr="1"/>
+        <a:lstStyle/>
+        <a:p>
+          <a:pPr>
+            <a:defRPr sz="1862" b="0" i="0" u="none" strike="noStrike" kern="1200" spc="0" baseline="0">
+              <a:solidFill>
+                <a:schemeClr val="tx1">
+                  <a:lumMod val="65000"/>
+                  <a:lumOff val="35000"/>
+                </a:schemeClr>
+              </a:solidFill>
+              <a:latin typeface="+mn-lt"/>
+              <a:ea typeface="+mn-ea"/>
+              <a:cs typeface="+mn-cs"/>
+            </a:defRPr>
+          </a:pPr>
+          <a:endParaRPr lang="en-US"/>
+        </a:p>
+      </c:txPr>
+    </c:title>
+    <c:autoTitleDeleted val="0"/>
+    <c:plotArea>
+      <c:layout/>
+      <c:barChart>
+        <c:barDir val="col"/>
+        <c:grouping val="clustered"/>
+        <c:varyColors val="0"/>
+        <c:ser>
+          <c:idx val="0"/>
+          <c:order val="0"/>
+          <c:tx>
+            <c:strRef>
+              <c:f>Sheet1!$B$1</c:f>
+              <c:strCache>
+                <c:ptCount val="1"/>
+                <c:pt idx="0">
+                  <c:v>RMSE</c:v>
+                </c:pt>
+              </c:strCache>
+            </c:strRef>
+          </c:tx>
+          <c:spPr>
+            <a:solidFill>
+              <a:schemeClr val="accent1"/>
+            </a:solidFill>
+            <a:ln>
+              <a:noFill/>
+            </a:ln>
+            <a:effectLst/>
+          </c:spPr>
+          <c:invertIfNegative val="0"/>
+          <c:dLbls>
+            <c:numFmt formatCode="#,##0.00" sourceLinked="0"/>
+            <c:spPr>
+              <a:noFill/>
+              <a:ln>
+                <a:noFill/>
+              </a:ln>
+              <a:effectLst/>
+            </c:spPr>
+            <c:txPr>
+              <a:bodyPr rot="0" spcFirstLastPara="1" vertOverflow="ellipsis" vert="horz" wrap="square" lIns="38100" tIns="19050" rIns="38100" bIns="19050" anchor="ctr" anchorCtr="1">
+                <a:spAutoFit/>
+              </a:bodyPr>
+              <a:lstStyle/>
+              <a:p>
+                <a:pPr>
+                  <a:defRPr sz="1197" b="0" i="0" u="none" strike="noStrike" kern="1200" baseline="0">
+                    <a:solidFill>
+                      <a:schemeClr val="tx1">
+                        <a:lumMod val="75000"/>
+                        <a:lumOff val="25000"/>
+                      </a:schemeClr>
+                    </a:solidFill>
+                    <a:latin typeface="+mn-lt"/>
+                    <a:ea typeface="+mn-ea"/>
+                    <a:cs typeface="+mn-cs"/>
+                  </a:defRPr>
+                </a:pPr>
+                <a:endParaRPr lang="en-US"/>
+              </a:p>
+            </c:txPr>
+            <c:showLegendKey val="0"/>
+            <c:showVal val="1"/>
+            <c:showCatName val="0"/>
+            <c:showSerName val="0"/>
+            <c:showPercent val="0"/>
+            <c:showBubbleSize val="0"/>
+            <c:showLeaderLines val="0"/>
+            <c:extLst>
+              <c:ext xmlns:c15="http://schemas.microsoft.com/office/drawing/2012/chart" uri="{CE6537A1-D6FC-4f65-9D91-7224C49458BB}">
+                <c15:showLeaderLines val="1"/>
+                <c15:leaderLines>
+                  <c:spPr>
+                    <a:ln w="9525" cap="flat" cmpd="sng" algn="ctr">
+                      <a:solidFill>
+                        <a:schemeClr val="tx1">
+                          <a:lumMod val="35000"/>
+                          <a:lumOff val="65000"/>
+                        </a:schemeClr>
+                      </a:solidFill>
+                      <a:round/>
+                    </a:ln>
+                    <a:effectLst/>
+                  </c:spPr>
+                </c15:leaderLines>
+              </c:ext>
+            </c:extLst>
+          </c:dLbls>
+          <c:cat>
+            <c:strRef>
+              <c:f>Sheet1!$A$2:$A$7</c:f>
+              <c:strCache>
+                <c:ptCount val="6"/>
+                <c:pt idx="0">
+                  <c:v>Naive</c:v>
+                </c:pt>
+                <c:pt idx="1">
+                  <c:v>Random Forests</c:v>
+                </c:pt>
+                <c:pt idx="2">
+                  <c:v>Boruta with Confirmed</c:v>
+                </c:pt>
+                <c:pt idx="3">
+                  <c:v>Boruta with Confirmed and Tentative</c:v>
+                </c:pt>
+                <c:pt idx="4">
+                  <c:v>LM</c:v>
+                </c:pt>
+                <c:pt idx="5">
+                  <c:v>Bagged Trees</c:v>
+                </c:pt>
+              </c:strCache>
+            </c:strRef>
+          </c:cat>
+          <c:val>
+            <c:numRef>
+              <c:f>Sheet1!$B$2:$B$7</c:f>
+              <c:numCache>
+                <c:formatCode>General</c:formatCode>
+                <c:ptCount val="6"/>
+                <c:pt idx="0">
+                  <c:v>9.4140309999999996</c:v>
+                </c:pt>
+                <c:pt idx="1">
+                  <c:v>3.3969589999999998</c:v>
+                </c:pt>
+                <c:pt idx="2">
+                  <c:v>3.2122220000000001</c:v>
+                </c:pt>
+                <c:pt idx="3">
+                  <c:v>3.1872820000000002</c:v>
+                </c:pt>
+                <c:pt idx="4">
+                  <c:v>3.353974</c:v>
+                </c:pt>
+                <c:pt idx="5">
+                  <c:v>3.1994030000000002</c:v>
+                </c:pt>
+              </c:numCache>
+            </c:numRef>
+          </c:val>
+          <c:extLst>
+            <c:ext xmlns:c16="http://schemas.microsoft.com/office/drawing/2014/chart" uri="{C3380CC4-5D6E-409C-BE32-E72D297353CC}">
+              <c16:uniqueId val="{00000000-72F3-4DDF-A8D5-A2BAA9C20CE9}"/>
+            </c:ext>
+          </c:extLst>
+        </c:ser>
+        <c:ser>
+          <c:idx val="1"/>
+          <c:order val="1"/>
+          <c:tx>
+            <c:strRef>
+              <c:f>Sheet1!$C$1</c:f>
+              <c:strCache>
+                <c:ptCount val="1"/>
+                <c:pt idx="0">
+                  <c:v>MAE</c:v>
+                </c:pt>
+              </c:strCache>
+            </c:strRef>
+          </c:tx>
+          <c:spPr>
+            <a:solidFill>
+              <a:schemeClr val="accent2"/>
+            </a:solidFill>
+            <a:ln>
+              <a:noFill/>
+            </a:ln>
+            <a:effectLst/>
+          </c:spPr>
+          <c:invertIfNegative val="0"/>
+          <c:dLbls>
+            <c:numFmt formatCode="#,##0.00" sourceLinked="0"/>
+            <c:spPr>
+              <a:noFill/>
+              <a:ln>
+                <a:noFill/>
+              </a:ln>
+              <a:effectLst/>
+            </c:spPr>
+            <c:txPr>
+              <a:bodyPr rot="0" spcFirstLastPara="1" vertOverflow="ellipsis" vert="horz" wrap="square" lIns="38100" tIns="19050" rIns="38100" bIns="19050" anchor="ctr" anchorCtr="1">
+                <a:spAutoFit/>
+              </a:bodyPr>
+              <a:lstStyle/>
+              <a:p>
+                <a:pPr>
+                  <a:defRPr sz="1197" b="0" i="0" u="none" strike="noStrike" kern="1200" baseline="0">
+                    <a:solidFill>
+                      <a:schemeClr val="tx1">
+                        <a:lumMod val="75000"/>
+                        <a:lumOff val="25000"/>
+                      </a:schemeClr>
+                    </a:solidFill>
+                    <a:latin typeface="+mn-lt"/>
+                    <a:ea typeface="+mn-ea"/>
+                    <a:cs typeface="+mn-cs"/>
+                  </a:defRPr>
+                </a:pPr>
+                <a:endParaRPr lang="en-US"/>
+              </a:p>
+            </c:txPr>
+            <c:showLegendKey val="0"/>
+            <c:showVal val="1"/>
+            <c:showCatName val="0"/>
+            <c:showSerName val="0"/>
+            <c:showPercent val="0"/>
+            <c:showBubbleSize val="0"/>
+            <c:showLeaderLines val="0"/>
+            <c:extLst>
+              <c:ext xmlns:c15="http://schemas.microsoft.com/office/drawing/2012/chart" uri="{CE6537A1-D6FC-4f65-9D91-7224C49458BB}">
+                <c15:showLeaderLines val="1"/>
+                <c15:leaderLines>
+                  <c:spPr>
+                    <a:ln w="9525" cap="flat" cmpd="sng" algn="ctr">
+                      <a:solidFill>
+                        <a:schemeClr val="tx1">
+                          <a:lumMod val="35000"/>
+                          <a:lumOff val="65000"/>
+                        </a:schemeClr>
+                      </a:solidFill>
+                      <a:round/>
+                    </a:ln>
+                    <a:effectLst/>
+                  </c:spPr>
+                </c15:leaderLines>
+              </c:ext>
+            </c:extLst>
+          </c:dLbls>
+          <c:cat>
+            <c:strRef>
+              <c:f>Sheet1!$A$2:$A$7</c:f>
+              <c:strCache>
+                <c:ptCount val="6"/>
+                <c:pt idx="0">
+                  <c:v>Naive</c:v>
+                </c:pt>
+                <c:pt idx="1">
+                  <c:v>Random Forests</c:v>
+                </c:pt>
+                <c:pt idx="2">
+                  <c:v>Boruta with Confirmed</c:v>
+                </c:pt>
+                <c:pt idx="3">
+                  <c:v>Boruta with Confirmed and Tentative</c:v>
+                </c:pt>
+                <c:pt idx="4">
+                  <c:v>LM</c:v>
+                </c:pt>
+                <c:pt idx="5">
+                  <c:v>Bagged Trees</c:v>
+                </c:pt>
+              </c:strCache>
+            </c:strRef>
+          </c:cat>
+          <c:val>
+            <c:numRef>
+              <c:f>Sheet1!$C$2:$C$7</c:f>
+              <c:numCache>
+                <c:formatCode>General</c:formatCode>
+                <c:ptCount val="6"/>
+                <c:pt idx="0">
+                  <c:v>7.8356050000000002</c:v>
+                </c:pt>
+                <c:pt idx="1">
+                  <c:v>2.6573530000000001</c:v>
+                </c:pt>
+                <c:pt idx="2">
+                  <c:v>2.5649850000000001</c:v>
+                </c:pt>
+                <c:pt idx="3">
+                  <c:v>2.491886</c:v>
+                </c:pt>
+                <c:pt idx="4">
+                  <c:v>2.667335</c:v>
+                </c:pt>
+                <c:pt idx="5">
+                  <c:v>2.4429310000000002</c:v>
+                </c:pt>
+              </c:numCache>
+            </c:numRef>
+          </c:val>
+          <c:extLst>
+            <c:ext xmlns:c16="http://schemas.microsoft.com/office/drawing/2014/chart" uri="{C3380CC4-5D6E-409C-BE32-E72D297353CC}">
+              <c16:uniqueId val="{00000001-72F3-4DDF-A8D5-A2BAA9C20CE9}"/>
+            </c:ext>
+          </c:extLst>
+        </c:ser>
+        <c:dLbls>
+          <c:showLegendKey val="0"/>
+          <c:showVal val="1"/>
+          <c:showCatName val="0"/>
+          <c:showSerName val="0"/>
+          <c:showPercent val="0"/>
+          <c:showBubbleSize val="0"/>
+        </c:dLbls>
+        <c:gapWidth val="150"/>
+        <c:overlap val="-25"/>
+        <c:axId val="205208383"/>
+        <c:axId val="205199263"/>
+      </c:barChart>
+      <c:catAx>
+        <c:axId val="205208383"/>
+        <c:scaling>
+          <c:orientation val="minMax"/>
+        </c:scaling>
+        <c:delete val="0"/>
+        <c:axPos val="b"/>
+        <c:numFmt formatCode="General" sourceLinked="1"/>
+        <c:majorTickMark val="none"/>
+        <c:minorTickMark val="none"/>
+        <c:tickLblPos val="nextTo"/>
+        <c:spPr>
+          <a:noFill/>
+          <a:ln w="9525" cap="flat" cmpd="sng" algn="ctr">
+            <a:solidFill>
+              <a:schemeClr val="tx1">
+                <a:lumMod val="15000"/>
+                <a:lumOff val="85000"/>
+              </a:schemeClr>
+            </a:solidFill>
+            <a:round/>
+          </a:ln>
+          <a:effectLst/>
+        </c:spPr>
+        <c:txPr>
+          <a:bodyPr rot="-60000000" spcFirstLastPara="1" vertOverflow="ellipsis" vert="horz" wrap="square" anchor="ctr" anchorCtr="1"/>
+          <a:lstStyle/>
+          <a:p>
+            <a:pPr>
+              <a:defRPr sz="1197" b="0" i="0" u="none" strike="noStrike" kern="1200" baseline="0">
+                <a:solidFill>
+                  <a:schemeClr val="tx1">
+                    <a:lumMod val="65000"/>
+                    <a:lumOff val="35000"/>
+                  </a:schemeClr>
+                </a:solidFill>
+                <a:latin typeface="+mn-lt"/>
+                <a:ea typeface="+mn-ea"/>
+                <a:cs typeface="+mn-cs"/>
+              </a:defRPr>
+            </a:pPr>
+            <a:endParaRPr lang="en-US"/>
+          </a:p>
+        </c:txPr>
+        <c:crossAx val="205199263"/>
+        <c:crosses val="autoZero"/>
+        <c:auto val="1"/>
+        <c:lblAlgn val="ctr"/>
+        <c:lblOffset val="100"/>
+        <c:noMultiLvlLbl val="0"/>
+      </c:catAx>
+      <c:valAx>
+        <c:axId val="205199263"/>
+        <c:scaling>
+          <c:orientation val="minMax"/>
+        </c:scaling>
+        <c:delete val="1"/>
+        <c:axPos val="l"/>
+        <c:numFmt formatCode="General" sourceLinked="1"/>
+        <c:majorTickMark val="none"/>
+        <c:minorTickMark val="none"/>
+        <c:tickLblPos val="nextTo"/>
+        <c:crossAx val="205208383"/>
+        <c:crosses val="autoZero"/>
+        <c:crossBetween val="between"/>
+      </c:valAx>
+      <c:spPr>
+        <a:noFill/>
+        <a:ln>
+          <a:noFill/>
+        </a:ln>
+        <a:effectLst/>
+      </c:spPr>
+    </c:plotArea>
+    <c:legend>
+      <c:legendPos val="t"/>
+      <c:overlay val="0"/>
+      <c:spPr>
+        <a:noFill/>
+        <a:ln>
+          <a:noFill/>
+        </a:ln>
+        <a:effectLst/>
+      </c:spPr>
+      <c:txPr>
+        <a:bodyPr rot="0" spcFirstLastPara="1" vertOverflow="ellipsis" vert="horz" wrap="square" anchor="ctr" anchorCtr="1"/>
+        <a:lstStyle/>
+        <a:p>
+          <a:pPr>
+            <a:defRPr sz="1197" b="0" i="0" u="none" strike="noStrike" kern="1200" baseline="0">
+              <a:solidFill>
+                <a:schemeClr val="tx1">
+                  <a:lumMod val="65000"/>
+                  <a:lumOff val="35000"/>
+                </a:schemeClr>
+              </a:solidFill>
+              <a:latin typeface="+mn-lt"/>
+              <a:ea typeface="+mn-ea"/>
+              <a:cs typeface="+mn-cs"/>
+            </a:defRPr>
+          </a:pPr>
+          <a:endParaRPr lang="en-US"/>
+        </a:p>
+      </c:txPr>
+    </c:legend>
+    <c:plotVisOnly val="1"/>
+    <c:dispBlanksAs val="gap"/>
+    <c:extLst>
+      <c:ext xmlns:c16r3="http://schemas.microsoft.com/office/drawing/2017/03/chart" uri="{56B9EC1D-385E-4148-901F-78D8002777C0}">
+        <c16r3:dataDisplayOptions16>
+          <c16r3:dispNaAsBlank val="1"/>
+        </c16r3:dataDisplayOptions16>
+      </c:ext>
+    </c:extLst>
+    <c:showDLblsOverMax val="0"/>
+  </c:chart>
+  <c:spPr>
+    <a:noFill/>
+    <a:ln>
+      <a:noFill/>
+    </a:ln>
+    <a:effectLst/>
+  </c:spPr>
+  <c:txPr>
+    <a:bodyPr/>
+    <a:lstStyle/>
+    <a:p>
+      <a:pPr>
+        <a:defRPr/>
+      </a:pPr>
+      <a:endParaRPr lang="en-US"/>
+    </a:p>
+  </c:txPr>
+  <c:externalData r:id="rId3">
+    <c:autoUpdate val="0"/>
+  </c:externalData>
+</c:chartSpace>
 </file>
 
 <file path=ppt/charts/chartEx1.xml><?xml version="1.0" encoding="utf-8"?>
@@ -442,6 +1464,86 @@
 </file>
 
 <file path=ppt/charts/colors2.xml><?xml version="1.0" encoding="utf-8"?>
+<cs:colorStyle xmlns:cs="http://schemas.microsoft.com/office/drawing/2012/chartStyle" xmlns:a="http://schemas.openxmlformats.org/drawingml/2006/main" meth="cycle" id="10">
+  <a:schemeClr val="accent1"/>
+  <a:schemeClr val="accent2"/>
+  <a:schemeClr val="accent3"/>
+  <a:schemeClr val="accent4"/>
+  <a:schemeClr val="accent5"/>
+  <a:schemeClr val="accent6"/>
+  <cs:variation/>
+  <cs:variation>
+    <a:lumMod val="60000"/>
+  </cs:variation>
+  <cs:variation>
+    <a:lumMod val="80000"/>
+    <a:lumOff val="20000"/>
+  </cs:variation>
+  <cs:variation>
+    <a:lumMod val="80000"/>
+  </cs:variation>
+  <cs:variation>
+    <a:lumMod val="60000"/>
+    <a:lumOff val="40000"/>
+  </cs:variation>
+  <cs:variation>
+    <a:lumMod val="50000"/>
+  </cs:variation>
+  <cs:variation>
+    <a:lumMod val="70000"/>
+    <a:lumOff val="30000"/>
+  </cs:variation>
+  <cs:variation>
+    <a:lumMod val="70000"/>
+  </cs:variation>
+  <cs:variation>
+    <a:lumMod val="50000"/>
+    <a:lumOff val="50000"/>
+  </cs:variation>
+</cs:colorStyle>
+</file>
+
+<file path=ppt/charts/colors3.xml><?xml version="1.0" encoding="utf-8"?>
+<cs:colorStyle xmlns:cs="http://schemas.microsoft.com/office/drawing/2012/chartStyle" xmlns:a="http://schemas.openxmlformats.org/drawingml/2006/main" meth="cycle" id="10">
+  <a:schemeClr val="accent1"/>
+  <a:schemeClr val="accent2"/>
+  <a:schemeClr val="accent3"/>
+  <a:schemeClr val="accent4"/>
+  <a:schemeClr val="accent5"/>
+  <a:schemeClr val="accent6"/>
+  <cs:variation/>
+  <cs:variation>
+    <a:lumMod val="60000"/>
+  </cs:variation>
+  <cs:variation>
+    <a:lumMod val="80000"/>
+    <a:lumOff val="20000"/>
+  </cs:variation>
+  <cs:variation>
+    <a:lumMod val="80000"/>
+  </cs:variation>
+  <cs:variation>
+    <a:lumMod val="60000"/>
+    <a:lumOff val="40000"/>
+  </cs:variation>
+  <cs:variation>
+    <a:lumMod val="50000"/>
+  </cs:variation>
+  <cs:variation>
+    <a:lumMod val="70000"/>
+    <a:lumOff val="30000"/>
+  </cs:variation>
+  <cs:variation>
+    <a:lumMod val="70000"/>
+  </cs:variation>
+  <cs:variation>
+    <a:lumMod val="50000"/>
+    <a:lumOff val="50000"/>
+  </cs:variation>
+</cs:colorStyle>
+</file>
+
+<file path=ppt/charts/colors4.xml><?xml version="1.0" encoding="utf-8"?>
 <cs:colorStyle xmlns:cs="http://schemas.microsoft.com/office/drawing/2012/chartStyle" xmlns:a="http://schemas.openxmlformats.org/drawingml/2006/main" meth="cycle" id="10">
   <a:schemeClr val="accent1"/>
   <a:schemeClr val="accent2"/>
@@ -1493,6 +2595,1012 @@
     <cs:fontRef idx="minor">
       <a:schemeClr val="tx1"/>
     </cs:fontRef>
+  </cs:wall>
+</cs:chartStyle>
+</file>
+
+<file path=ppt/charts/style3.xml><?xml version="1.0" encoding="utf-8"?>
+<cs:chartStyle xmlns:cs="http://schemas.microsoft.com/office/drawing/2012/chartStyle" xmlns:a="http://schemas.openxmlformats.org/drawingml/2006/main" id="201">
+  <cs:axisTitle>
+    <cs:lnRef idx="0"/>
+    <cs:fillRef idx="0"/>
+    <cs:effectRef idx="0"/>
+    <cs:fontRef idx="minor">
+      <a:schemeClr val="tx1">
+        <a:lumMod val="65000"/>
+        <a:lumOff val="35000"/>
+      </a:schemeClr>
+    </cs:fontRef>
+    <cs:defRPr sz="1330" kern="1200"/>
+  </cs:axisTitle>
+  <cs:categoryAxis>
+    <cs:lnRef idx="0"/>
+    <cs:fillRef idx="0"/>
+    <cs:effectRef idx="0"/>
+    <cs:fontRef idx="minor">
+      <a:schemeClr val="tx1">
+        <a:lumMod val="65000"/>
+        <a:lumOff val="35000"/>
+      </a:schemeClr>
+    </cs:fontRef>
+    <cs:spPr>
+      <a:ln w="9525" cap="flat" cmpd="sng" algn="ctr">
+        <a:solidFill>
+          <a:schemeClr val="tx1">
+            <a:lumMod val="15000"/>
+            <a:lumOff val="85000"/>
+          </a:schemeClr>
+        </a:solidFill>
+        <a:round/>
+      </a:ln>
+    </cs:spPr>
+    <cs:defRPr sz="1197" kern="1200"/>
+  </cs:categoryAxis>
+  <cs:chartArea mods="allowNoFillOverride allowNoLineOverride">
+    <cs:lnRef idx="0"/>
+    <cs:fillRef idx="0"/>
+    <cs:effectRef idx="0"/>
+    <cs:fontRef idx="minor">
+      <a:schemeClr val="tx1"/>
+    </cs:fontRef>
+    <cs:spPr>
+      <a:solidFill>
+        <a:schemeClr val="bg1"/>
+      </a:solidFill>
+      <a:ln w="9525" cap="flat" cmpd="sng" algn="ctr">
+        <a:solidFill>
+          <a:schemeClr val="tx1">
+            <a:lumMod val="15000"/>
+            <a:lumOff val="85000"/>
+          </a:schemeClr>
+        </a:solidFill>
+        <a:round/>
+      </a:ln>
+    </cs:spPr>
+    <cs:defRPr sz="1330" kern="1200"/>
+  </cs:chartArea>
+  <cs:dataLabel>
+    <cs:lnRef idx="0"/>
+    <cs:fillRef idx="0"/>
+    <cs:effectRef idx="0"/>
+    <cs:fontRef idx="minor">
+      <a:schemeClr val="tx1">
+        <a:lumMod val="75000"/>
+        <a:lumOff val="25000"/>
+      </a:schemeClr>
+    </cs:fontRef>
+    <cs:defRPr sz="1197" kern="1200"/>
+  </cs:dataLabel>
+  <cs:dataLabelCallout>
+    <cs:lnRef idx="0"/>
+    <cs:fillRef idx="0"/>
+    <cs:effectRef idx="0"/>
+    <cs:fontRef idx="minor">
+      <a:schemeClr val="dk1">
+        <a:lumMod val="65000"/>
+        <a:lumOff val="35000"/>
+      </a:schemeClr>
+    </cs:fontRef>
+    <cs:spPr>
+      <a:solidFill>
+        <a:schemeClr val="lt1"/>
+      </a:solidFill>
+      <a:ln>
+        <a:solidFill>
+          <a:schemeClr val="dk1">
+            <a:lumMod val="25000"/>
+            <a:lumOff val="75000"/>
+          </a:schemeClr>
+        </a:solidFill>
+      </a:ln>
+    </cs:spPr>
+    <cs:defRPr sz="1197" kern="1200"/>
+    <cs:bodyPr rot="0" spcFirstLastPara="1" vertOverflow="clip" horzOverflow="clip" vert="horz" wrap="square" lIns="36576" tIns="18288" rIns="36576" bIns="18288" anchor="ctr" anchorCtr="1">
+      <a:spAutoFit/>
+    </cs:bodyPr>
+  </cs:dataLabelCallout>
+  <cs:dataPoint>
+    <cs:lnRef idx="0"/>
+    <cs:fillRef idx="1">
+      <cs:styleClr val="auto"/>
+    </cs:fillRef>
+    <cs:effectRef idx="0"/>
+    <cs:fontRef idx="minor">
+      <a:schemeClr val="tx1"/>
+    </cs:fontRef>
+  </cs:dataPoint>
+  <cs:dataPoint3D>
+    <cs:lnRef idx="0"/>
+    <cs:fillRef idx="1">
+      <cs:styleClr val="auto"/>
+    </cs:fillRef>
+    <cs:effectRef idx="0"/>
+    <cs:fontRef idx="minor">
+      <a:schemeClr val="tx1"/>
+    </cs:fontRef>
+  </cs:dataPoint3D>
+  <cs:dataPointLine>
+    <cs:lnRef idx="0">
+      <cs:styleClr val="auto"/>
+    </cs:lnRef>
+    <cs:fillRef idx="1"/>
+    <cs:effectRef idx="0"/>
+    <cs:fontRef idx="minor">
+      <a:schemeClr val="tx1"/>
+    </cs:fontRef>
+    <cs:spPr>
+      <a:ln w="28575" cap="rnd">
+        <a:solidFill>
+          <a:schemeClr val="phClr"/>
+        </a:solidFill>
+        <a:round/>
+      </a:ln>
+    </cs:spPr>
+  </cs:dataPointLine>
+  <cs:dataPointMarker>
+    <cs:lnRef idx="0">
+      <cs:styleClr val="auto"/>
+    </cs:lnRef>
+    <cs:fillRef idx="1">
+      <cs:styleClr val="auto"/>
+    </cs:fillRef>
+    <cs:effectRef idx="0"/>
+    <cs:fontRef idx="minor">
+      <a:schemeClr val="tx1"/>
+    </cs:fontRef>
+    <cs:spPr>
+      <a:ln w="9525">
+        <a:solidFill>
+          <a:schemeClr val="phClr"/>
+        </a:solidFill>
+      </a:ln>
+    </cs:spPr>
+  </cs:dataPointMarker>
+  <cs:dataPointMarkerLayout symbol="circle" size="5"/>
+  <cs:dataPointWireframe>
+    <cs:lnRef idx="0">
+      <cs:styleClr val="auto"/>
+    </cs:lnRef>
+    <cs:fillRef idx="1"/>
+    <cs:effectRef idx="0"/>
+    <cs:fontRef idx="minor">
+      <a:schemeClr val="tx1"/>
+    </cs:fontRef>
+    <cs:spPr>
+      <a:ln w="9525" cap="rnd">
+        <a:solidFill>
+          <a:schemeClr val="phClr"/>
+        </a:solidFill>
+        <a:round/>
+      </a:ln>
+    </cs:spPr>
+  </cs:dataPointWireframe>
+  <cs:dataTable>
+    <cs:lnRef idx="0"/>
+    <cs:fillRef idx="0"/>
+    <cs:effectRef idx="0"/>
+    <cs:fontRef idx="minor">
+      <a:schemeClr val="tx1">
+        <a:lumMod val="65000"/>
+        <a:lumOff val="35000"/>
+      </a:schemeClr>
+    </cs:fontRef>
+    <cs:spPr>
+      <a:noFill/>
+      <a:ln w="9525" cap="flat" cmpd="sng" algn="ctr">
+        <a:solidFill>
+          <a:schemeClr val="tx1">
+            <a:lumMod val="15000"/>
+            <a:lumOff val="85000"/>
+          </a:schemeClr>
+        </a:solidFill>
+        <a:round/>
+      </a:ln>
+    </cs:spPr>
+    <cs:defRPr sz="1197" kern="1200"/>
+  </cs:dataTable>
+  <cs:downBar>
+    <cs:lnRef idx="0"/>
+    <cs:fillRef idx="0"/>
+    <cs:effectRef idx="0"/>
+    <cs:fontRef idx="minor">
+      <a:schemeClr val="dk1"/>
+    </cs:fontRef>
+    <cs:spPr>
+      <a:solidFill>
+        <a:schemeClr val="dk1">
+          <a:lumMod val="65000"/>
+          <a:lumOff val="35000"/>
+        </a:schemeClr>
+      </a:solidFill>
+      <a:ln w="9525">
+        <a:solidFill>
+          <a:schemeClr val="tx1">
+            <a:lumMod val="65000"/>
+            <a:lumOff val="35000"/>
+          </a:schemeClr>
+        </a:solidFill>
+      </a:ln>
+    </cs:spPr>
+  </cs:downBar>
+  <cs:dropLine>
+    <cs:lnRef idx="0"/>
+    <cs:fillRef idx="0"/>
+    <cs:effectRef idx="0"/>
+    <cs:fontRef idx="minor">
+      <a:schemeClr val="tx1"/>
+    </cs:fontRef>
+    <cs:spPr>
+      <a:ln w="9525" cap="flat" cmpd="sng" algn="ctr">
+        <a:solidFill>
+          <a:schemeClr val="tx1">
+            <a:lumMod val="35000"/>
+            <a:lumOff val="65000"/>
+          </a:schemeClr>
+        </a:solidFill>
+        <a:round/>
+      </a:ln>
+    </cs:spPr>
+  </cs:dropLine>
+  <cs:errorBar>
+    <cs:lnRef idx="0"/>
+    <cs:fillRef idx="0"/>
+    <cs:effectRef idx="0"/>
+    <cs:fontRef idx="minor">
+      <a:schemeClr val="tx1"/>
+    </cs:fontRef>
+    <cs:spPr>
+      <a:ln w="9525" cap="flat" cmpd="sng" algn="ctr">
+        <a:solidFill>
+          <a:schemeClr val="tx1">
+            <a:lumMod val="65000"/>
+            <a:lumOff val="35000"/>
+          </a:schemeClr>
+        </a:solidFill>
+        <a:round/>
+      </a:ln>
+    </cs:spPr>
+  </cs:errorBar>
+  <cs:floor>
+    <cs:lnRef idx="0"/>
+    <cs:fillRef idx="0"/>
+    <cs:effectRef idx="0"/>
+    <cs:fontRef idx="minor">
+      <a:schemeClr val="tx1"/>
+    </cs:fontRef>
+    <cs:spPr>
+      <a:noFill/>
+      <a:ln>
+        <a:noFill/>
+      </a:ln>
+    </cs:spPr>
+  </cs:floor>
+  <cs:gridlineMajor>
+    <cs:lnRef idx="0"/>
+    <cs:fillRef idx="0"/>
+    <cs:effectRef idx="0"/>
+    <cs:fontRef idx="minor">
+      <a:schemeClr val="tx1"/>
+    </cs:fontRef>
+    <cs:spPr>
+      <a:ln w="9525" cap="flat" cmpd="sng" algn="ctr">
+        <a:solidFill>
+          <a:schemeClr val="tx1">
+            <a:lumMod val="15000"/>
+            <a:lumOff val="85000"/>
+          </a:schemeClr>
+        </a:solidFill>
+        <a:round/>
+      </a:ln>
+    </cs:spPr>
+  </cs:gridlineMajor>
+  <cs:gridlineMinor>
+    <cs:lnRef idx="0"/>
+    <cs:fillRef idx="0"/>
+    <cs:effectRef idx="0"/>
+    <cs:fontRef idx="minor">
+      <a:schemeClr val="tx1"/>
+    </cs:fontRef>
+    <cs:spPr>
+      <a:ln w="9525" cap="flat" cmpd="sng" algn="ctr">
+        <a:solidFill>
+          <a:schemeClr val="tx1">
+            <a:lumMod val="5000"/>
+            <a:lumOff val="95000"/>
+          </a:schemeClr>
+        </a:solidFill>
+        <a:round/>
+      </a:ln>
+    </cs:spPr>
+  </cs:gridlineMinor>
+  <cs:hiLoLine>
+    <cs:lnRef idx="0"/>
+    <cs:fillRef idx="0"/>
+    <cs:effectRef idx="0"/>
+    <cs:fontRef idx="minor">
+      <a:schemeClr val="tx1"/>
+    </cs:fontRef>
+    <cs:spPr>
+      <a:ln w="9525" cap="flat" cmpd="sng" algn="ctr">
+        <a:solidFill>
+          <a:schemeClr val="tx1">
+            <a:lumMod val="75000"/>
+            <a:lumOff val="25000"/>
+          </a:schemeClr>
+        </a:solidFill>
+        <a:round/>
+      </a:ln>
+    </cs:spPr>
+  </cs:hiLoLine>
+  <cs:leaderLine>
+    <cs:lnRef idx="0"/>
+    <cs:fillRef idx="0"/>
+    <cs:effectRef idx="0"/>
+    <cs:fontRef idx="minor">
+      <a:schemeClr val="tx1"/>
+    </cs:fontRef>
+    <cs:spPr>
+      <a:ln w="9525" cap="flat" cmpd="sng" algn="ctr">
+        <a:solidFill>
+          <a:schemeClr val="tx1">
+            <a:lumMod val="35000"/>
+            <a:lumOff val="65000"/>
+          </a:schemeClr>
+        </a:solidFill>
+        <a:round/>
+      </a:ln>
+    </cs:spPr>
+  </cs:leaderLine>
+  <cs:legend>
+    <cs:lnRef idx="0"/>
+    <cs:fillRef idx="0"/>
+    <cs:effectRef idx="0"/>
+    <cs:fontRef idx="minor">
+      <a:schemeClr val="tx1">
+        <a:lumMod val="65000"/>
+        <a:lumOff val="35000"/>
+      </a:schemeClr>
+    </cs:fontRef>
+    <cs:defRPr sz="1197" kern="1200"/>
+  </cs:legend>
+  <cs:plotArea mods="allowNoFillOverride allowNoLineOverride">
+    <cs:lnRef idx="0"/>
+    <cs:fillRef idx="0"/>
+    <cs:effectRef idx="0"/>
+    <cs:fontRef idx="minor">
+      <a:schemeClr val="tx1"/>
+    </cs:fontRef>
+  </cs:plotArea>
+  <cs:plotArea3D mods="allowNoFillOverride allowNoLineOverride">
+    <cs:lnRef idx="0"/>
+    <cs:fillRef idx="0"/>
+    <cs:effectRef idx="0"/>
+    <cs:fontRef idx="minor">
+      <a:schemeClr val="tx1"/>
+    </cs:fontRef>
+  </cs:plotArea3D>
+  <cs:seriesAxis>
+    <cs:lnRef idx="0"/>
+    <cs:fillRef idx="0"/>
+    <cs:effectRef idx="0"/>
+    <cs:fontRef idx="minor">
+      <a:schemeClr val="tx1">
+        <a:lumMod val="65000"/>
+        <a:lumOff val="35000"/>
+      </a:schemeClr>
+    </cs:fontRef>
+    <cs:defRPr sz="1197" kern="1200"/>
+  </cs:seriesAxis>
+  <cs:seriesLine>
+    <cs:lnRef idx="0"/>
+    <cs:fillRef idx="0"/>
+    <cs:effectRef idx="0"/>
+    <cs:fontRef idx="minor">
+      <a:schemeClr val="tx1"/>
+    </cs:fontRef>
+    <cs:spPr>
+      <a:ln w="9525" cap="flat" cmpd="sng" algn="ctr">
+        <a:solidFill>
+          <a:schemeClr val="tx1">
+            <a:lumMod val="35000"/>
+            <a:lumOff val="65000"/>
+          </a:schemeClr>
+        </a:solidFill>
+        <a:round/>
+      </a:ln>
+    </cs:spPr>
+  </cs:seriesLine>
+  <cs:title>
+    <cs:lnRef idx="0"/>
+    <cs:fillRef idx="0"/>
+    <cs:effectRef idx="0"/>
+    <cs:fontRef idx="minor">
+      <a:schemeClr val="tx1">
+        <a:lumMod val="65000"/>
+        <a:lumOff val="35000"/>
+      </a:schemeClr>
+    </cs:fontRef>
+    <cs:defRPr sz="1862" b="0" kern="1200" spc="0" baseline="0"/>
+  </cs:title>
+  <cs:trendline>
+    <cs:lnRef idx="0">
+      <cs:styleClr val="auto"/>
+    </cs:lnRef>
+    <cs:fillRef idx="0"/>
+    <cs:effectRef idx="0"/>
+    <cs:fontRef idx="minor">
+      <a:schemeClr val="tx1"/>
+    </cs:fontRef>
+    <cs:spPr>
+      <a:ln w="19050" cap="rnd">
+        <a:solidFill>
+          <a:schemeClr val="phClr"/>
+        </a:solidFill>
+        <a:prstDash val="sysDot"/>
+      </a:ln>
+    </cs:spPr>
+  </cs:trendline>
+  <cs:trendlineLabel>
+    <cs:lnRef idx="0"/>
+    <cs:fillRef idx="0"/>
+    <cs:effectRef idx="0"/>
+    <cs:fontRef idx="minor">
+      <a:schemeClr val="tx1">
+        <a:lumMod val="65000"/>
+        <a:lumOff val="35000"/>
+      </a:schemeClr>
+    </cs:fontRef>
+    <cs:defRPr sz="1197" kern="1200"/>
+  </cs:trendlineLabel>
+  <cs:upBar>
+    <cs:lnRef idx="0"/>
+    <cs:fillRef idx="0"/>
+    <cs:effectRef idx="0"/>
+    <cs:fontRef idx="minor">
+      <a:schemeClr val="dk1"/>
+    </cs:fontRef>
+    <cs:spPr>
+      <a:solidFill>
+        <a:schemeClr val="lt1"/>
+      </a:solidFill>
+      <a:ln w="9525">
+        <a:solidFill>
+          <a:schemeClr val="tx1">
+            <a:lumMod val="15000"/>
+            <a:lumOff val="85000"/>
+          </a:schemeClr>
+        </a:solidFill>
+      </a:ln>
+    </cs:spPr>
+  </cs:upBar>
+  <cs:valueAxis>
+    <cs:lnRef idx="0"/>
+    <cs:fillRef idx="0"/>
+    <cs:effectRef idx="0"/>
+    <cs:fontRef idx="minor">
+      <a:schemeClr val="tx1">
+        <a:lumMod val="65000"/>
+        <a:lumOff val="35000"/>
+      </a:schemeClr>
+    </cs:fontRef>
+    <cs:defRPr sz="1197" kern="1200"/>
+  </cs:valueAxis>
+  <cs:wall>
+    <cs:lnRef idx="0"/>
+    <cs:fillRef idx="0"/>
+    <cs:effectRef idx="0"/>
+    <cs:fontRef idx="minor">
+      <a:schemeClr val="tx1"/>
+    </cs:fontRef>
+    <cs:spPr>
+      <a:noFill/>
+      <a:ln>
+        <a:noFill/>
+      </a:ln>
+    </cs:spPr>
+  </cs:wall>
+</cs:chartStyle>
+</file>
+
+<file path=ppt/charts/style4.xml><?xml version="1.0" encoding="utf-8"?>
+<cs:chartStyle xmlns:cs="http://schemas.microsoft.com/office/drawing/2012/chartStyle" xmlns:a="http://schemas.openxmlformats.org/drawingml/2006/main" id="201">
+  <cs:axisTitle>
+    <cs:lnRef idx="0"/>
+    <cs:fillRef idx="0"/>
+    <cs:effectRef idx="0"/>
+    <cs:fontRef idx="minor">
+      <a:schemeClr val="tx1">
+        <a:lumMod val="65000"/>
+        <a:lumOff val="35000"/>
+      </a:schemeClr>
+    </cs:fontRef>
+    <cs:defRPr sz="1330" kern="1200"/>
+  </cs:axisTitle>
+  <cs:categoryAxis>
+    <cs:lnRef idx="0"/>
+    <cs:fillRef idx="0"/>
+    <cs:effectRef idx="0"/>
+    <cs:fontRef idx="minor">
+      <a:schemeClr val="tx1">
+        <a:lumMod val="65000"/>
+        <a:lumOff val="35000"/>
+      </a:schemeClr>
+    </cs:fontRef>
+    <cs:spPr>
+      <a:ln w="9525" cap="flat" cmpd="sng" algn="ctr">
+        <a:solidFill>
+          <a:schemeClr val="tx1">
+            <a:lumMod val="15000"/>
+            <a:lumOff val="85000"/>
+          </a:schemeClr>
+        </a:solidFill>
+        <a:round/>
+      </a:ln>
+    </cs:spPr>
+    <cs:defRPr sz="1197" kern="1200"/>
+  </cs:categoryAxis>
+  <cs:chartArea mods="allowNoFillOverride allowNoLineOverride">
+    <cs:lnRef idx="0"/>
+    <cs:fillRef idx="0"/>
+    <cs:effectRef idx="0"/>
+    <cs:fontRef idx="minor">
+      <a:schemeClr val="tx1"/>
+    </cs:fontRef>
+    <cs:spPr>
+      <a:solidFill>
+        <a:schemeClr val="bg1"/>
+      </a:solidFill>
+      <a:ln w="9525" cap="flat" cmpd="sng" algn="ctr">
+        <a:solidFill>
+          <a:schemeClr val="tx1">
+            <a:lumMod val="15000"/>
+            <a:lumOff val="85000"/>
+          </a:schemeClr>
+        </a:solidFill>
+        <a:round/>
+      </a:ln>
+    </cs:spPr>
+    <cs:defRPr sz="1330" kern="1200"/>
+  </cs:chartArea>
+  <cs:dataLabel>
+    <cs:lnRef idx="0"/>
+    <cs:fillRef idx="0"/>
+    <cs:effectRef idx="0"/>
+    <cs:fontRef idx="minor">
+      <a:schemeClr val="tx1">
+        <a:lumMod val="75000"/>
+        <a:lumOff val="25000"/>
+      </a:schemeClr>
+    </cs:fontRef>
+    <cs:defRPr sz="1197" kern="1200"/>
+  </cs:dataLabel>
+  <cs:dataLabelCallout>
+    <cs:lnRef idx="0"/>
+    <cs:fillRef idx="0"/>
+    <cs:effectRef idx="0"/>
+    <cs:fontRef idx="minor">
+      <a:schemeClr val="dk1">
+        <a:lumMod val="65000"/>
+        <a:lumOff val="35000"/>
+      </a:schemeClr>
+    </cs:fontRef>
+    <cs:spPr>
+      <a:solidFill>
+        <a:schemeClr val="lt1"/>
+      </a:solidFill>
+      <a:ln>
+        <a:solidFill>
+          <a:schemeClr val="dk1">
+            <a:lumMod val="25000"/>
+            <a:lumOff val="75000"/>
+          </a:schemeClr>
+        </a:solidFill>
+      </a:ln>
+    </cs:spPr>
+    <cs:defRPr sz="1197" kern="1200"/>
+    <cs:bodyPr rot="0" spcFirstLastPara="1" vertOverflow="clip" horzOverflow="clip" vert="horz" wrap="square" lIns="36576" tIns="18288" rIns="36576" bIns="18288" anchor="ctr" anchorCtr="1">
+      <a:spAutoFit/>
+    </cs:bodyPr>
+  </cs:dataLabelCallout>
+  <cs:dataPoint>
+    <cs:lnRef idx="0"/>
+    <cs:fillRef idx="1">
+      <cs:styleClr val="auto"/>
+    </cs:fillRef>
+    <cs:effectRef idx="0"/>
+    <cs:fontRef idx="minor">
+      <a:schemeClr val="tx1"/>
+    </cs:fontRef>
+  </cs:dataPoint>
+  <cs:dataPoint3D>
+    <cs:lnRef idx="0"/>
+    <cs:fillRef idx="1">
+      <cs:styleClr val="auto"/>
+    </cs:fillRef>
+    <cs:effectRef idx="0"/>
+    <cs:fontRef idx="minor">
+      <a:schemeClr val="tx1"/>
+    </cs:fontRef>
+  </cs:dataPoint3D>
+  <cs:dataPointLine>
+    <cs:lnRef idx="0">
+      <cs:styleClr val="auto"/>
+    </cs:lnRef>
+    <cs:fillRef idx="1"/>
+    <cs:effectRef idx="0"/>
+    <cs:fontRef idx="minor">
+      <a:schemeClr val="tx1"/>
+    </cs:fontRef>
+    <cs:spPr>
+      <a:ln w="28575" cap="rnd">
+        <a:solidFill>
+          <a:schemeClr val="phClr"/>
+        </a:solidFill>
+        <a:round/>
+      </a:ln>
+    </cs:spPr>
+  </cs:dataPointLine>
+  <cs:dataPointMarker>
+    <cs:lnRef idx="0">
+      <cs:styleClr val="auto"/>
+    </cs:lnRef>
+    <cs:fillRef idx="1">
+      <cs:styleClr val="auto"/>
+    </cs:fillRef>
+    <cs:effectRef idx="0"/>
+    <cs:fontRef idx="minor">
+      <a:schemeClr val="tx1"/>
+    </cs:fontRef>
+    <cs:spPr>
+      <a:ln w="9525">
+        <a:solidFill>
+          <a:schemeClr val="phClr"/>
+        </a:solidFill>
+      </a:ln>
+    </cs:spPr>
+  </cs:dataPointMarker>
+  <cs:dataPointMarkerLayout symbol="circle" size="5"/>
+  <cs:dataPointWireframe>
+    <cs:lnRef idx="0">
+      <cs:styleClr val="auto"/>
+    </cs:lnRef>
+    <cs:fillRef idx="1"/>
+    <cs:effectRef idx="0"/>
+    <cs:fontRef idx="minor">
+      <a:schemeClr val="tx1"/>
+    </cs:fontRef>
+    <cs:spPr>
+      <a:ln w="9525" cap="rnd">
+        <a:solidFill>
+          <a:schemeClr val="phClr"/>
+        </a:solidFill>
+        <a:round/>
+      </a:ln>
+    </cs:spPr>
+  </cs:dataPointWireframe>
+  <cs:dataTable>
+    <cs:lnRef idx="0"/>
+    <cs:fillRef idx="0"/>
+    <cs:effectRef idx="0"/>
+    <cs:fontRef idx="minor">
+      <a:schemeClr val="tx1">
+        <a:lumMod val="65000"/>
+        <a:lumOff val="35000"/>
+      </a:schemeClr>
+    </cs:fontRef>
+    <cs:spPr>
+      <a:noFill/>
+      <a:ln w="9525" cap="flat" cmpd="sng" algn="ctr">
+        <a:solidFill>
+          <a:schemeClr val="tx1">
+            <a:lumMod val="15000"/>
+            <a:lumOff val="85000"/>
+          </a:schemeClr>
+        </a:solidFill>
+        <a:round/>
+      </a:ln>
+    </cs:spPr>
+    <cs:defRPr sz="1197" kern="1200"/>
+  </cs:dataTable>
+  <cs:downBar>
+    <cs:lnRef idx="0"/>
+    <cs:fillRef idx="0"/>
+    <cs:effectRef idx="0"/>
+    <cs:fontRef idx="minor">
+      <a:schemeClr val="dk1"/>
+    </cs:fontRef>
+    <cs:spPr>
+      <a:solidFill>
+        <a:schemeClr val="dk1">
+          <a:lumMod val="65000"/>
+          <a:lumOff val="35000"/>
+        </a:schemeClr>
+      </a:solidFill>
+      <a:ln w="9525">
+        <a:solidFill>
+          <a:schemeClr val="tx1">
+            <a:lumMod val="65000"/>
+            <a:lumOff val="35000"/>
+          </a:schemeClr>
+        </a:solidFill>
+      </a:ln>
+    </cs:spPr>
+  </cs:downBar>
+  <cs:dropLine>
+    <cs:lnRef idx="0"/>
+    <cs:fillRef idx="0"/>
+    <cs:effectRef idx="0"/>
+    <cs:fontRef idx="minor">
+      <a:schemeClr val="tx1"/>
+    </cs:fontRef>
+    <cs:spPr>
+      <a:ln w="9525" cap="flat" cmpd="sng" algn="ctr">
+        <a:solidFill>
+          <a:schemeClr val="tx1">
+            <a:lumMod val="35000"/>
+            <a:lumOff val="65000"/>
+          </a:schemeClr>
+        </a:solidFill>
+        <a:round/>
+      </a:ln>
+    </cs:spPr>
+  </cs:dropLine>
+  <cs:errorBar>
+    <cs:lnRef idx="0"/>
+    <cs:fillRef idx="0"/>
+    <cs:effectRef idx="0"/>
+    <cs:fontRef idx="minor">
+      <a:schemeClr val="tx1"/>
+    </cs:fontRef>
+    <cs:spPr>
+      <a:ln w="9525" cap="flat" cmpd="sng" algn="ctr">
+        <a:solidFill>
+          <a:schemeClr val="tx1">
+            <a:lumMod val="65000"/>
+            <a:lumOff val="35000"/>
+          </a:schemeClr>
+        </a:solidFill>
+        <a:round/>
+      </a:ln>
+    </cs:spPr>
+  </cs:errorBar>
+  <cs:floor>
+    <cs:lnRef idx="0"/>
+    <cs:fillRef idx="0"/>
+    <cs:effectRef idx="0"/>
+    <cs:fontRef idx="minor">
+      <a:schemeClr val="tx1"/>
+    </cs:fontRef>
+    <cs:spPr>
+      <a:noFill/>
+      <a:ln>
+        <a:noFill/>
+      </a:ln>
+    </cs:spPr>
+  </cs:floor>
+  <cs:gridlineMajor>
+    <cs:lnRef idx="0"/>
+    <cs:fillRef idx="0"/>
+    <cs:effectRef idx="0"/>
+    <cs:fontRef idx="minor">
+      <a:schemeClr val="tx1"/>
+    </cs:fontRef>
+    <cs:spPr>
+      <a:ln w="9525" cap="flat" cmpd="sng" algn="ctr">
+        <a:solidFill>
+          <a:schemeClr val="tx1">
+            <a:lumMod val="15000"/>
+            <a:lumOff val="85000"/>
+          </a:schemeClr>
+        </a:solidFill>
+        <a:round/>
+      </a:ln>
+    </cs:spPr>
+  </cs:gridlineMajor>
+  <cs:gridlineMinor>
+    <cs:lnRef idx="0"/>
+    <cs:fillRef idx="0"/>
+    <cs:effectRef idx="0"/>
+    <cs:fontRef idx="minor">
+      <a:schemeClr val="tx1"/>
+    </cs:fontRef>
+    <cs:spPr>
+      <a:ln w="9525" cap="flat" cmpd="sng" algn="ctr">
+        <a:solidFill>
+          <a:schemeClr val="tx1">
+            <a:lumMod val="5000"/>
+            <a:lumOff val="95000"/>
+          </a:schemeClr>
+        </a:solidFill>
+        <a:round/>
+      </a:ln>
+    </cs:spPr>
+  </cs:gridlineMinor>
+  <cs:hiLoLine>
+    <cs:lnRef idx="0"/>
+    <cs:fillRef idx="0"/>
+    <cs:effectRef idx="0"/>
+    <cs:fontRef idx="minor">
+      <a:schemeClr val="tx1"/>
+    </cs:fontRef>
+    <cs:spPr>
+      <a:ln w="9525" cap="flat" cmpd="sng" algn="ctr">
+        <a:solidFill>
+          <a:schemeClr val="tx1">
+            <a:lumMod val="75000"/>
+            <a:lumOff val="25000"/>
+          </a:schemeClr>
+        </a:solidFill>
+        <a:round/>
+      </a:ln>
+    </cs:spPr>
+  </cs:hiLoLine>
+  <cs:leaderLine>
+    <cs:lnRef idx="0"/>
+    <cs:fillRef idx="0"/>
+    <cs:effectRef idx="0"/>
+    <cs:fontRef idx="minor">
+      <a:schemeClr val="tx1"/>
+    </cs:fontRef>
+    <cs:spPr>
+      <a:ln w="9525" cap="flat" cmpd="sng" algn="ctr">
+        <a:solidFill>
+          <a:schemeClr val="tx1">
+            <a:lumMod val="35000"/>
+            <a:lumOff val="65000"/>
+          </a:schemeClr>
+        </a:solidFill>
+        <a:round/>
+      </a:ln>
+    </cs:spPr>
+  </cs:leaderLine>
+  <cs:legend>
+    <cs:lnRef idx="0"/>
+    <cs:fillRef idx="0"/>
+    <cs:effectRef idx="0"/>
+    <cs:fontRef idx="minor">
+      <a:schemeClr val="tx1">
+        <a:lumMod val="65000"/>
+        <a:lumOff val="35000"/>
+      </a:schemeClr>
+    </cs:fontRef>
+    <cs:defRPr sz="1197" kern="1200"/>
+  </cs:legend>
+  <cs:plotArea mods="allowNoFillOverride allowNoLineOverride">
+    <cs:lnRef idx="0"/>
+    <cs:fillRef idx="0"/>
+    <cs:effectRef idx="0"/>
+    <cs:fontRef idx="minor">
+      <a:schemeClr val="tx1"/>
+    </cs:fontRef>
+  </cs:plotArea>
+  <cs:plotArea3D mods="allowNoFillOverride allowNoLineOverride">
+    <cs:lnRef idx="0"/>
+    <cs:fillRef idx="0"/>
+    <cs:effectRef idx="0"/>
+    <cs:fontRef idx="minor">
+      <a:schemeClr val="tx1"/>
+    </cs:fontRef>
+  </cs:plotArea3D>
+  <cs:seriesAxis>
+    <cs:lnRef idx="0"/>
+    <cs:fillRef idx="0"/>
+    <cs:effectRef idx="0"/>
+    <cs:fontRef idx="minor">
+      <a:schemeClr val="tx1">
+        <a:lumMod val="65000"/>
+        <a:lumOff val="35000"/>
+      </a:schemeClr>
+    </cs:fontRef>
+    <cs:defRPr sz="1197" kern="1200"/>
+  </cs:seriesAxis>
+  <cs:seriesLine>
+    <cs:lnRef idx="0"/>
+    <cs:fillRef idx="0"/>
+    <cs:effectRef idx="0"/>
+    <cs:fontRef idx="minor">
+      <a:schemeClr val="tx1"/>
+    </cs:fontRef>
+    <cs:spPr>
+      <a:ln w="9525" cap="flat" cmpd="sng" algn="ctr">
+        <a:solidFill>
+          <a:schemeClr val="tx1">
+            <a:lumMod val="35000"/>
+            <a:lumOff val="65000"/>
+          </a:schemeClr>
+        </a:solidFill>
+        <a:round/>
+      </a:ln>
+    </cs:spPr>
+  </cs:seriesLine>
+  <cs:title>
+    <cs:lnRef idx="0"/>
+    <cs:fillRef idx="0"/>
+    <cs:effectRef idx="0"/>
+    <cs:fontRef idx="minor">
+      <a:schemeClr val="tx1">
+        <a:lumMod val="65000"/>
+        <a:lumOff val="35000"/>
+      </a:schemeClr>
+    </cs:fontRef>
+    <cs:defRPr sz="1862" b="0" kern="1200" spc="0" baseline="0"/>
+  </cs:title>
+  <cs:trendline>
+    <cs:lnRef idx="0">
+      <cs:styleClr val="auto"/>
+    </cs:lnRef>
+    <cs:fillRef idx="0"/>
+    <cs:effectRef idx="0"/>
+    <cs:fontRef idx="minor">
+      <a:schemeClr val="tx1"/>
+    </cs:fontRef>
+    <cs:spPr>
+      <a:ln w="19050" cap="rnd">
+        <a:solidFill>
+          <a:schemeClr val="phClr"/>
+        </a:solidFill>
+        <a:prstDash val="sysDot"/>
+      </a:ln>
+    </cs:spPr>
+  </cs:trendline>
+  <cs:trendlineLabel>
+    <cs:lnRef idx="0"/>
+    <cs:fillRef idx="0"/>
+    <cs:effectRef idx="0"/>
+    <cs:fontRef idx="minor">
+      <a:schemeClr val="tx1">
+        <a:lumMod val="65000"/>
+        <a:lumOff val="35000"/>
+      </a:schemeClr>
+    </cs:fontRef>
+    <cs:defRPr sz="1197" kern="1200"/>
+  </cs:trendlineLabel>
+  <cs:upBar>
+    <cs:lnRef idx="0"/>
+    <cs:fillRef idx="0"/>
+    <cs:effectRef idx="0"/>
+    <cs:fontRef idx="minor">
+      <a:schemeClr val="dk1"/>
+    </cs:fontRef>
+    <cs:spPr>
+      <a:solidFill>
+        <a:schemeClr val="lt1"/>
+      </a:solidFill>
+      <a:ln w="9525">
+        <a:solidFill>
+          <a:schemeClr val="tx1">
+            <a:lumMod val="15000"/>
+            <a:lumOff val="85000"/>
+          </a:schemeClr>
+        </a:solidFill>
+      </a:ln>
+    </cs:spPr>
+  </cs:upBar>
+  <cs:valueAxis>
+    <cs:lnRef idx="0"/>
+    <cs:fillRef idx="0"/>
+    <cs:effectRef idx="0"/>
+    <cs:fontRef idx="minor">
+      <a:schemeClr val="tx1">
+        <a:lumMod val="65000"/>
+        <a:lumOff val="35000"/>
+      </a:schemeClr>
+    </cs:fontRef>
+    <cs:defRPr sz="1197" kern="1200"/>
+  </cs:valueAxis>
+  <cs:wall>
+    <cs:lnRef idx="0"/>
+    <cs:fillRef idx="0"/>
+    <cs:effectRef idx="0"/>
+    <cs:fontRef idx="minor">
+      <a:schemeClr val="tx1"/>
+    </cs:fontRef>
+    <cs:spPr>
+      <a:noFill/>
+      <a:ln>
+        <a:noFill/>
+      </a:ln>
+    </cs:spPr>
   </cs:wall>
 </cs:chartStyle>
 </file>
@@ -13591,6 +15699,104 @@
 </p:sld>
 </file>
 
+<file path=ppt/slides/slide10.xml><?xml version="1.0" encoding="utf-8"?>
+<p:sld xmlns:a="http://schemas.openxmlformats.org/drawingml/2006/main" xmlns:r="http://schemas.openxmlformats.org/officeDocument/2006/relationships" xmlns:p="http://schemas.openxmlformats.org/presentationml/2006/main">
+  <p:cSld>
+    <p:spTree>
+      <p:nvGrpSpPr>
+        <p:cNvPr id="1" name=""/>
+        <p:cNvGrpSpPr/>
+        <p:nvPr/>
+      </p:nvGrpSpPr>
+      <p:grpSpPr>
+        <a:xfrm>
+          <a:off x="0" y="0"/>
+          <a:ext cx="0" cy="0"/>
+          <a:chOff x="0" y="0"/>
+          <a:chExt cx="0" cy="0"/>
+        </a:xfrm>
+      </p:grpSpPr>
+      <p:sp>
+        <p:nvSpPr>
+          <p:cNvPr id="2" name="Title 1">
+            <a:extLst>
+              <a:ext uri="{FF2B5EF4-FFF2-40B4-BE49-F238E27FC236}">
+                <a16:creationId xmlns:a16="http://schemas.microsoft.com/office/drawing/2014/main" id="{7F6DFF47-4B52-5475-0D19-A85DD28B541F}"/>
+              </a:ext>
+            </a:extLst>
+          </p:cNvPr>
+          <p:cNvSpPr>
+            <a:spLocks noGrp="1"/>
+          </p:cNvSpPr>
+          <p:nvPr>
+            <p:ph type="title"/>
+          </p:nvPr>
+        </p:nvSpPr>
+        <p:spPr/>
+        <p:txBody>
+          <a:bodyPr/>
+          <a:lstStyle/>
+          <a:p>
+            <a:r>
+              <a:rPr lang="en-IN" dirty="0"/>
+              <a:t>Compare methods</a:t>
+            </a:r>
+          </a:p>
+        </p:txBody>
+      </p:sp>
+      <p:graphicFrame>
+        <p:nvGraphicFramePr>
+          <p:cNvPr id="5" name="Chart 4">
+            <a:extLst>
+              <a:ext uri="{FF2B5EF4-FFF2-40B4-BE49-F238E27FC236}">
+                <a16:creationId xmlns:a16="http://schemas.microsoft.com/office/drawing/2014/main" id="{F3B09CCC-D7F6-E940-7E00-7534545FCF3B}"/>
+              </a:ext>
+            </a:extLst>
+          </p:cNvPr>
+          <p:cNvGraphicFramePr/>
+          <p:nvPr>
+            <p:extLst>
+              <p:ext uri="{D42A27DB-BD31-4B8C-83A1-F6EECF244321}">
+                <p14:modId xmlns:p14="http://schemas.microsoft.com/office/powerpoint/2010/main" val="4063497994"/>
+              </p:ext>
+            </p:extLst>
+          </p:nvPr>
+        </p:nvGraphicFramePr>
+        <p:xfrm>
+          <a:off x="2499659" y="2052918"/>
+          <a:ext cx="7192682" cy="4094380"/>
+        </p:xfrm>
+        <a:graphic>
+          <a:graphicData uri="http://schemas.openxmlformats.org/drawingml/2006/chart">
+            <c:chart xmlns:c="http://schemas.openxmlformats.org/drawingml/2006/chart" xmlns:r="http://schemas.openxmlformats.org/officeDocument/2006/relationships" r:id="rId2"/>
+          </a:graphicData>
+        </a:graphic>
+      </p:graphicFrame>
+    </p:spTree>
+    <p:extLst>
+      <p:ext uri="{BB962C8B-B14F-4D97-AF65-F5344CB8AC3E}">
+        <p14:creationId xmlns:p14="http://schemas.microsoft.com/office/powerpoint/2010/main" val="244294319"/>
+      </p:ext>
+    </p:extLst>
+  </p:cSld>
+  <p:clrMapOvr>
+    <a:masterClrMapping/>
+  </p:clrMapOvr>
+  <mc:AlternateContent xmlns:mc="http://schemas.openxmlformats.org/markup-compatibility/2006">
+    <mc:Choice xmlns:p159="http://schemas.microsoft.com/office/powerpoint/2015/09/main" Requires="p159">
+      <p:transition xmlns:p14="http://schemas.microsoft.com/office/powerpoint/2010/main" spd="slow" p14:dur="2000">
+        <p159:morph option="byObject"/>
+      </p:transition>
+    </mc:Choice>
+    <mc:Fallback>
+      <p:transition spd="slow">
+        <p:fade/>
+      </p:transition>
+    </mc:Fallback>
+  </mc:AlternateContent>
+</p:sld>
+</file>
+
 <file path=ppt/slides/slide2.xml><?xml version="1.0" encoding="utf-8"?>
 <p:sld xmlns:a="http://schemas.openxmlformats.org/drawingml/2006/main" xmlns:r="http://schemas.openxmlformats.org/officeDocument/2006/relationships" xmlns:p="http://schemas.openxmlformats.org/presentationml/2006/main">
   <p:cSld>
@@ -14440,13 +16646,13 @@
   <p:clrMapOvr>
     <a:masterClrMapping/>
   </p:clrMapOvr>
-  <mc:AlternateContent xmlns:mc="http://schemas.openxmlformats.org/markup-compatibility/2006">
-    <mc:Choice xmlns:p159="http://schemas.microsoft.com/office/powerpoint/2015/09/main" Requires="p159">
+  <mc:AlternateContent xmlns:mc="http://schemas.openxmlformats.org/markup-compatibility/2006" xmlns:p159="http://schemas.microsoft.com/office/powerpoint/2015/09/main">
+    <mc:Choice Requires="p159">
       <p:transition spd="slow">
         <p159:morph option="byObject"/>
       </p:transition>
     </mc:Choice>
-    <mc:Fallback>
+    <mc:Fallback xmlns="">
       <p:transition spd="slow">
         <p:fade/>
       </p:transition>
@@ -14783,13 +16989,13 @@
   <p:clrMapOvr>
     <a:masterClrMapping/>
   </p:clrMapOvr>
-  <mc:AlternateContent xmlns:mc="http://schemas.openxmlformats.org/markup-compatibility/2006">
-    <mc:Choice xmlns:p159="http://schemas.microsoft.com/office/powerpoint/2015/09/main" Requires="p159">
+  <mc:AlternateContent xmlns:mc="http://schemas.openxmlformats.org/markup-compatibility/2006" xmlns:p159="http://schemas.microsoft.com/office/powerpoint/2015/09/main">
+    <mc:Choice Requires="p159">
       <p:transition spd="slow">
         <p159:morph option="byObject"/>
       </p:transition>
     </mc:Choice>
-    <mc:Fallback>
+    <mc:Fallback xmlns="">
       <p:transition spd="slow">
         <p:fade/>
       </p:transition>
@@ -15209,8 +17415,8 @@
           </a:p>
         </p:txBody>
       </p:sp>
-      <mc:AlternateContent xmlns:mc="http://schemas.openxmlformats.org/markup-compatibility/2006">
-        <mc:Choice xmlns:cx1="http://schemas.microsoft.com/office/drawing/2015/9/8/chartex" Requires="cx1">
+      <mc:AlternateContent xmlns:mc="http://schemas.openxmlformats.org/markup-compatibility/2006" xmlns:cx1="http://schemas.microsoft.com/office/drawing/2015/9/8/chartex">
+        <mc:Choice Requires="cx1">
           <p:graphicFrame>
             <p:nvGraphicFramePr>
               <p:cNvPr id="5" name="Chart 4">
@@ -15240,7 +17446,7 @@
             </a:graphic>
           </p:graphicFrame>
         </mc:Choice>
-        <mc:Fallback>
+        <mc:Fallback xmlns="">
           <p:pic>
             <p:nvPicPr>
               <p:cNvPr id="5" name="Chart 4">
@@ -15295,6 +17501,92 @@
       </p:transition>
     </mc:Fallback>
   </mc:AlternateContent>
+</p:sld>
+</file>
+
+<file path=ppt/slides/slide9.xml><?xml version="1.0" encoding="utf-8"?>
+<p:sld xmlns:a="http://schemas.openxmlformats.org/drawingml/2006/main" xmlns:r="http://schemas.openxmlformats.org/officeDocument/2006/relationships" xmlns:p="http://schemas.openxmlformats.org/presentationml/2006/main">
+  <p:cSld>
+    <p:spTree>
+      <p:nvGrpSpPr>
+        <p:cNvPr id="1" name=""/>
+        <p:cNvGrpSpPr/>
+        <p:nvPr/>
+      </p:nvGrpSpPr>
+      <p:grpSpPr>
+        <a:xfrm>
+          <a:off x="0" y="0"/>
+          <a:ext cx="0" cy="0"/>
+          <a:chOff x="0" y="0"/>
+          <a:chExt cx="0" cy="0"/>
+        </a:xfrm>
+      </p:grpSpPr>
+      <p:sp>
+        <p:nvSpPr>
+          <p:cNvPr id="2" name="Title 1">
+            <a:extLst>
+              <a:ext uri="{FF2B5EF4-FFF2-40B4-BE49-F238E27FC236}">
+                <a16:creationId xmlns:a16="http://schemas.microsoft.com/office/drawing/2014/main" id="{7F6DFF47-4B52-5475-0D19-A85DD28B541F}"/>
+              </a:ext>
+            </a:extLst>
+          </p:cNvPr>
+          <p:cNvSpPr>
+            <a:spLocks noGrp="1"/>
+          </p:cNvSpPr>
+          <p:nvPr>
+            <p:ph type="title"/>
+          </p:nvPr>
+        </p:nvSpPr>
+        <p:spPr/>
+        <p:txBody>
+          <a:bodyPr/>
+          <a:lstStyle/>
+          <a:p>
+            <a:r>
+              <a:rPr lang="en-IN" dirty="0"/>
+              <a:t>Compare methods</a:t>
+            </a:r>
+          </a:p>
+        </p:txBody>
+      </p:sp>
+      <p:graphicFrame>
+        <p:nvGraphicFramePr>
+          <p:cNvPr id="5" name="Chart 4">
+            <a:extLst>
+              <a:ext uri="{FF2B5EF4-FFF2-40B4-BE49-F238E27FC236}">
+                <a16:creationId xmlns:a16="http://schemas.microsoft.com/office/drawing/2014/main" id="{F3B09CCC-D7F6-E940-7E00-7534545FCF3B}"/>
+              </a:ext>
+            </a:extLst>
+          </p:cNvPr>
+          <p:cNvGraphicFramePr/>
+          <p:nvPr>
+            <p:extLst>
+              <p:ext uri="{D42A27DB-BD31-4B8C-83A1-F6EECF244321}">
+                <p14:modId xmlns:p14="http://schemas.microsoft.com/office/powerpoint/2010/main" val="2113311456"/>
+              </p:ext>
+            </p:extLst>
+          </p:nvPr>
+        </p:nvGraphicFramePr>
+        <p:xfrm>
+          <a:off x="2499659" y="2043953"/>
+          <a:ext cx="7192682" cy="4094380"/>
+        </p:xfrm>
+        <a:graphic>
+          <a:graphicData uri="http://schemas.openxmlformats.org/drawingml/2006/chart">
+            <c:chart xmlns:c="http://schemas.openxmlformats.org/drawingml/2006/chart" xmlns:r="http://schemas.openxmlformats.org/officeDocument/2006/relationships" r:id="rId2"/>
+          </a:graphicData>
+        </a:graphic>
+      </p:graphicFrame>
+    </p:spTree>
+    <p:extLst>
+      <p:ext uri="{BB962C8B-B14F-4D97-AF65-F5344CB8AC3E}">
+        <p14:creationId xmlns:p14="http://schemas.microsoft.com/office/powerpoint/2010/main" val="452059803"/>
+      </p:ext>
+    </p:extLst>
+  </p:cSld>
+  <p:clrMapOvr>
+    <a:masterClrMapping/>
+  </p:clrMapOvr>
 </p:sld>
 </file>
 

</xml_diff>